<commit_message>
Added SDK project to test network ports
</commit_message>
<xml_diff>
--- a/docs/CSCI460_Presentation.pptx
+++ b/docs/CSCI460_Presentation.pptx
@@ -11,6 +11,9 @@
     <p:sldId id="311" r:id="rId5"/>
     <p:sldId id="312" r:id="rId6"/>
     <p:sldId id="313" r:id="rId7"/>
+    <p:sldId id="315" r:id="rId8"/>
+    <p:sldId id="314" r:id="rId9"/>
+    <p:sldId id="316" r:id="rId10"/>
   </p:sldIdLst>
   <p:sldSz cx="12192000" cy="6858000"/>
   <p:notesSz cx="6858000" cy="9144000"/>
@@ -120,6 +123,9 @@
             <p14:sldId id="311"/>
             <p14:sldId id="312"/>
             <p14:sldId id="313"/>
+            <p14:sldId id="315"/>
+            <p14:sldId id="314"/>
+            <p14:sldId id="316"/>
           </p14:sldIdLst>
         </p14:section>
       </p14:sectionLst>
@@ -480,7 +486,7 @@
           <a:p>
             <a:fld id="{2A6D1854-81C2-4FDA-8865-EF069E4E10D9}" type="datetimeFigureOut">
               <a:rPr lang="en-US" smtClean="0"/>
-              <a:t>11/20/2019</a:t>
+              <a:t>11/21/2019</a:t>
             </a:fld>
             <a:endParaRPr lang="en-US"/>
           </a:p>
@@ -648,7 +654,7 @@
           <a:p>
             <a:fld id="{2A6D1854-81C2-4FDA-8865-EF069E4E10D9}" type="datetimeFigureOut">
               <a:rPr lang="en-US" smtClean="0"/>
-              <a:t>11/20/2019</a:t>
+              <a:t>11/21/2019</a:t>
             </a:fld>
             <a:endParaRPr lang="en-US"/>
           </a:p>
@@ -826,7 +832,7 @@
           <a:p>
             <a:fld id="{2A6D1854-81C2-4FDA-8865-EF069E4E10D9}" type="datetimeFigureOut">
               <a:rPr lang="en-US" smtClean="0"/>
-              <a:t>11/20/2019</a:t>
+              <a:t>11/21/2019</a:t>
             </a:fld>
             <a:endParaRPr lang="en-US"/>
           </a:p>
@@ -994,7 +1000,7 @@
           <a:p>
             <a:fld id="{2A6D1854-81C2-4FDA-8865-EF069E4E10D9}" type="datetimeFigureOut">
               <a:rPr lang="en-US" smtClean="0"/>
-              <a:t>11/20/2019</a:t>
+              <a:t>11/21/2019</a:t>
             </a:fld>
             <a:endParaRPr lang="en-US"/>
           </a:p>
@@ -1239,7 +1245,7 @@
           <a:p>
             <a:fld id="{2A6D1854-81C2-4FDA-8865-EF069E4E10D9}" type="datetimeFigureOut">
               <a:rPr lang="en-US" smtClean="0"/>
-              <a:t>11/20/2019</a:t>
+              <a:t>11/21/2019</a:t>
             </a:fld>
             <a:endParaRPr lang="en-US"/>
           </a:p>
@@ -1468,7 +1474,7 @@
           <a:p>
             <a:fld id="{2A6D1854-81C2-4FDA-8865-EF069E4E10D9}" type="datetimeFigureOut">
               <a:rPr lang="en-US" smtClean="0"/>
-              <a:t>11/20/2019</a:t>
+              <a:t>11/21/2019</a:t>
             </a:fld>
             <a:endParaRPr lang="en-US"/>
           </a:p>
@@ -1832,7 +1838,7 @@
           <a:p>
             <a:fld id="{2A6D1854-81C2-4FDA-8865-EF069E4E10D9}" type="datetimeFigureOut">
               <a:rPr lang="en-US" smtClean="0"/>
-              <a:t>11/20/2019</a:t>
+              <a:t>11/21/2019</a:t>
             </a:fld>
             <a:endParaRPr lang="en-US"/>
           </a:p>
@@ -1949,7 +1955,7 @@
           <a:p>
             <a:fld id="{2A6D1854-81C2-4FDA-8865-EF069E4E10D9}" type="datetimeFigureOut">
               <a:rPr lang="en-US" smtClean="0"/>
-              <a:t>11/20/2019</a:t>
+              <a:t>11/21/2019</a:t>
             </a:fld>
             <a:endParaRPr lang="en-US"/>
           </a:p>
@@ -2044,7 +2050,7 @@
           <a:p>
             <a:fld id="{2A6D1854-81C2-4FDA-8865-EF069E4E10D9}" type="datetimeFigureOut">
               <a:rPr lang="en-US" smtClean="0"/>
-              <a:t>11/20/2019</a:t>
+              <a:t>11/21/2019</a:t>
             </a:fld>
             <a:endParaRPr lang="en-US"/>
           </a:p>
@@ -2319,7 +2325,7 @@
           <a:p>
             <a:fld id="{2A6D1854-81C2-4FDA-8865-EF069E4E10D9}" type="datetimeFigureOut">
               <a:rPr lang="en-US" smtClean="0"/>
-              <a:t>11/20/2019</a:t>
+              <a:t>11/21/2019</a:t>
             </a:fld>
             <a:endParaRPr lang="en-US"/>
           </a:p>
@@ -2571,7 +2577,7 @@
           <a:p>
             <a:fld id="{2A6D1854-81C2-4FDA-8865-EF069E4E10D9}" type="datetimeFigureOut">
               <a:rPr lang="en-US" smtClean="0"/>
-              <a:t>11/20/2019</a:t>
+              <a:t>11/21/2019</a:t>
             </a:fld>
             <a:endParaRPr lang="en-US"/>
           </a:p>
@@ -2788,7 +2794,7 @@
           <a:p>
             <a:fld id="{2A6D1854-81C2-4FDA-8865-EF069E4E10D9}" type="datetimeFigureOut">
               <a:rPr lang="en-US" smtClean="0"/>
-              <a:t>11/20/2019</a:t>
+              <a:t>11/21/2019</a:t>
             </a:fld>
             <a:endParaRPr lang="en-US"/>
           </a:p>
@@ -3211,29 +3217,14 @@
           <a:lstStyle/>
           <a:p>
             <a:r>
-              <a:rPr lang="en-US" sz="4800" dirty="0" smtClean="0">
+              <a:rPr lang="en-US" sz="4800" dirty="0">
                 <a:solidFill>
                   <a:schemeClr val="bg1"/>
                 </a:solidFill>
                 <a:latin typeface="Acre Medium" panose="00000600000000000000" pitchFamily="50" charset="0"/>
               </a:rPr>
-              <a:t>LINUX ON AN </a:t>
-            </a:r>
-            <a:r>
-              <a:rPr lang="en-US" sz="4800" dirty="0">
-                <a:solidFill>
-                  <a:schemeClr val="bg1"/>
-                </a:solidFill>
-                <a:latin typeface="Acre Medium" panose="00000600000000000000" pitchFamily="50" charset="0"/>
-              </a:rPr>
-              <a:t>FPGA</a:t>
-            </a:r>
-            <a:endParaRPr lang="en-US" sz="4800" dirty="0">
-              <a:solidFill>
-                <a:schemeClr val="bg1"/>
-              </a:solidFill>
-              <a:latin typeface="Acre Medium" panose="00000600000000000000" pitchFamily="50" charset="0"/>
-            </a:endParaRPr>
+              <a:t>LINUX ON AN FPGA</a:t>
+            </a:r>
           </a:p>
         </p:txBody>
       </p:sp>
@@ -3253,33 +3244,23 @@
           <a:lstStyle/>
           <a:p>
             <a:r>
-              <a:rPr lang="en-US" dirty="0" smtClean="0">
+              <a:rPr lang="en-US" dirty="0">
                 <a:solidFill>
                   <a:schemeClr val="bg1"/>
                 </a:solidFill>
               </a:rPr>
               <a:t>Chris Major</a:t>
             </a:r>
-            <a:endParaRPr lang="en-US" dirty="0">
-              <a:solidFill>
-                <a:schemeClr val="bg1"/>
-              </a:solidFill>
-            </a:endParaRPr>
-          </a:p>
-          <a:p>
-            <a:r>
-              <a:rPr lang="en-US" dirty="0" smtClean="0">
+          </a:p>
+          <a:p>
+            <a:r>
+              <a:rPr lang="en-US" dirty="0">
                 <a:solidFill>
                   <a:schemeClr val="bg1"/>
                 </a:solidFill>
               </a:rPr>
               <a:t>CSCI460 – Operating Systems</a:t>
             </a:r>
-            <a:endParaRPr lang="en-US" dirty="0">
-              <a:solidFill>
-                <a:schemeClr val="bg1"/>
-              </a:solidFill>
-            </a:endParaRPr>
           </a:p>
           <a:p>
             <a:r>
@@ -3346,7 +3327,7 @@
           <a:lstStyle/>
           <a:p>
             <a:r>
-              <a:rPr lang="en-US" dirty="0" smtClean="0">
+              <a:rPr lang="en-US" dirty="0">
                 <a:solidFill>
                   <a:schemeClr val="bg1"/>
                 </a:solidFill>
@@ -3388,7 +3369,7 @@
               <a:buNone/>
             </a:pPr>
             <a:r>
-              <a:rPr lang="en-US" dirty="0" smtClean="0">
+              <a:rPr lang="en-US" dirty="0">
                 <a:solidFill>
                   <a:schemeClr val="bg1"/>
                 </a:solidFill>
@@ -3396,7 +3377,7 @@
               <a:t>Develop a </a:t>
             </a:r>
             <a:r>
-              <a:rPr lang="en-US" dirty="0" smtClean="0">
+              <a:rPr lang="en-US" dirty="0">
                 <a:solidFill>
                   <a:schemeClr val="accent1"/>
                 </a:solidFill>
@@ -3404,7 +3385,7 @@
               <a:t>custom hardware design </a:t>
             </a:r>
             <a:r>
-              <a:rPr lang="en-US" dirty="0" smtClean="0">
+              <a:rPr lang="en-US" dirty="0">
                 <a:solidFill>
                   <a:schemeClr val="bg1"/>
                 </a:solidFill>
@@ -3420,7 +3401,7 @@
               <a:t> </a:t>
             </a:r>
             <a:r>
-              <a:rPr lang="en-US" dirty="0" err="1" smtClean="0">
+              <a:rPr lang="en-US" dirty="0" err="1">
                 <a:solidFill>
                   <a:schemeClr val="accent1"/>
                 </a:solidFill>
@@ -3428,7 +3409,7 @@
               <a:t>Yocto</a:t>
             </a:r>
             <a:r>
-              <a:rPr lang="en-US" dirty="0" smtClean="0">
+              <a:rPr lang="en-US" dirty="0">
                 <a:solidFill>
                   <a:schemeClr val="accent1"/>
                 </a:solidFill>
@@ -3496,7 +3477,7 @@
           <a:lstStyle/>
           <a:p>
             <a:r>
-              <a:rPr lang="en-US" dirty="0" smtClean="0">
+              <a:rPr lang="en-US" dirty="0">
                 <a:solidFill>
                   <a:schemeClr val="bg1"/>
                 </a:solidFill>
@@ -3535,7 +3516,7 @@
           <a:lstStyle/>
           <a:p>
             <a:r>
-              <a:rPr lang="en-US" dirty="0" smtClean="0">
+              <a:rPr lang="en-US" dirty="0">
                 <a:solidFill>
                   <a:schemeClr val="bg1"/>
                 </a:solidFill>
@@ -3545,7 +3526,7 @@
           </a:p>
           <a:p>
             <a:r>
-              <a:rPr lang="en-US" dirty="0" smtClean="0">
+              <a:rPr lang="en-US" dirty="0">
                 <a:solidFill>
                   <a:schemeClr val="bg1"/>
                 </a:solidFill>
@@ -3555,7 +3536,7 @@
           </a:p>
           <a:p>
             <a:r>
-              <a:rPr lang="en-US" dirty="0" smtClean="0">
+              <a:rPr lang="en-US" dirty="0">
                 <a:solidFill>
                   <a:schemeClr val="bg1"/>
                 </a:solidFill>
@@ -3564,7 +3545,7 @@
             </a:r>
           </a:p>
           <a:p>
-            <a:endParaRPr lang="en-US" dirty="0" smtClean="0">
+            <a:endParaRPr lang="en-US" dirty="0">
               <a:solidFill>
                 <a:schemeClr val="bg1"/>
               </a:solidFill>
@@ -3782,11 +3763,6 @@
               </a:rPr>
               <a:t>Image from https://www.coursera.org/learn/intro-fpga-design-embedded-systems</a:t>
             </a:r>
-            <a:endParaRPr lang="en-US" sz="1200" i="1" dirty="0">
-              <a:solidFill>
-                <a:schemeClr val="bg1"/>
-              </a:solidFill>
-            </a:endParaRPr>
           </a:p>
         </p:txBody>
       </p:sp>
@@ -3871,7 +3847,7 @@
           <a:lstStyle/>
           <a:p>
             <a:r>
-              <a:rPr lang="en-US" dirty="0" smtClean="0">
+              <a:rPr lang="en-US" dirty="0">
                 <a:solidFill>
                   <a:schemeClr val="bg1"/>
                 </a:solidFill>
@@ -3910,7 +3886,7 @@
           <a:lstStyle/>
           <a:p>
             <a:r>
-              <a:rPr lang="en-US" dirty="0" smtClean="0">
+              <a:rPr lang="en-US" dirty="0">
                 <a:solidFill>
                   <a:schemeClr val="bg1"/>
                 </a:solidFill>
@@ -3920,7 +3896,7 @@
           </a:p>
           <a:p>
             <a:r>
-              <a:rPr lang="en-US" dirty="0" smtClean="0">
+              <a:rPr lang="en-US" dirty="0">
                 <a:solidFill>
                   <a:schemeClr val="bg1"/>
                 </a:solidFill>
@@ -3930,7 +3906,7 @@
           </a:p>
           <a:p>
             <a:r>
-              <a:rPr lang="en-US" dirty="0" smtClean="0">
+              <a:rPr lang="en-US" dirty="0">
                 <a:solidFill>
                   <a:schemeClr val="bg1"/>
                 </a:solidFill>
@@ -3940,21 +3916,16 @@
           </a:p>
           <a:p>
             <a:r>
-              <a:rPr lang="en-US" dirty="0" smtClean="0">
+              <a:rPr lang="en-US" dirty="0">
                 <a:solidFill>
                   <a:schemeClr val="bg1"/>
                 </a:solidFill>
               </a:rPr>
               <a:t>GPIO for additional functionality</a:t>
             </a:r>
-            <a:endParaRPr lang="en-US" dirty="0" smtClean="0">
-              <a:solidFill>
-                <a:schemeClr val="bg1"/>
-              </a:solidFill>
-            </a:endParaRPr>
-          </a:p>
-          <a:p>
-            <a:endParaRPr lang="en-US" dirty="0" smtClean="0">
+          </a:p>
+          <a:p>
+            <a:endParaRPr lang="en-US" dirty="0">
               <a:solidFill>
                 <a:schemeClr val="bg1"/>
               </a:solidFill>
@@ -4172,11 +4143,6 @@
               </a:rPr>
               <a:t>Image from https://store.digilentinc.com/arty-a7-artix-7-fpga-development-board-for-makers-and-hobbyists/</a:t>
             </a:r>
-            <a:endParaRPr lang="en-US" sz="1200" i="1" dirty="0">
-              <a:solidFill>
-                <a:schemeClr val="bg1"/>
-              </a:solidFill>
-            </a:endParaRPr>
           </a:p>
         </p:txBody>
       </p:sp>
@@ -4196,14 +4162,13 @@
               </a:ext>
             </a:extLst>
           </a:blip>
-          <a:stretch>
-            <a:fillRect/>
-          </a:stretch>
+          <a:srcRect/>
+          <a:stretch/>
         </p:blipFill>
         <p:spPr>
           <a:xfrm>
-            <a:off x="6487886" y="1771678"/>
-            <a:ext cx="4646814" cy="3643102"/>
+            <a:off x="6506473" y="1771678"/>
+            <a:ext cx="4609639" cy="3643102"/>
           </a:xfrm>
           <a:prstGeom prst="rect">
             <a:avLst/>
@@ -4261,7 +4226,7 @@
           <a:lstStyle/>
           <a:p>
             <a:r>
-              <a:rPr lang="en-US" dirty="0" smtClean="0">
+              <a:rPr lang="en-US" dirty="0">
                 <a:solidFill>
                   <a:schemeClr val="bg1"/>
                 </a:solidFill>
@@ -4300,21 +4265,16 @@
           <a:lstStyle/>
           <a:p>
             <a:r>
-              <a:rPr lang="en-US" dirty="0" smtClean="0">
+              <a:rPr lang="en-US" dirty="0">
                 <a:solidFill>
                   <a:schemeClr val="bg1"/>
                 </a:solidFill>
               </a:rPr>
               <a:t>Uses a Xilinx Artix-7 XC7A35T FPGA chip</a:t>
             </a:r>
-            <a:endParaRPr lang="en-US" dirty="0" smtClean="0">
-              <a:solidFill>
-                <a:schemeClr val="bg1"/>
-              </a:solidFill>
-            </a:endParaRPr>
-          </a:p>
-          <a:p>
-            <a:endParaRPr lang="en-US" dirty="0" smtClean="0">
+          </a:p>
+          <a:p>
+            <a:endParaRPr lang="en-US" dirty="0">
               <a:solidFill>
                 <a:schemeClr val="bg1"/>
               </a:solidFill>
@@ -4532,11 +4492,6 @@
               </a:rPr>
               <a:t>Image from https://store.digilentinc.com/arty-a7-artix-7-fpga-development-board-for-makers-and-hobbyists/</a:t>
             </a:r>
-            <a:endParaRPr lang="en-US" sz="1200" i="1" dirty="0">
-              <a:solidFill>
-                <a:schemeClr val="bg1"/>
-              </a:solidFill>
-            </a:endParaRPr>
           </a:p>
         </p:txBody>
       </p:sp>
@@ -4556,14 +4511,13 @@
               </a:ext>
             </a:extLst>
           </a:blip>
-          <a:stretch>
-            <a:fillRect/>
-          </a:stretch>
+          <a:srcRect/>
+          <a:stretch/>
         </p:blipFill>
         <p:spPr>
           <a:xfrm>
-            <a:off x="6487886" y="1771678"/>
-            <a:ext cx="4646813" cy="3643102"/>
+            <a:off x="6506473" y="1771678"/>
+            <a:ext cx="4609639" cy="3643102"/>
           </a:xfrm>
           <a:prstGeom prst="rect">
             <a:avLst/>
@@ -4621,7 +4575,7 @@
           <a:lstStyle/>
           <a:p>
             <a:r>
-              <a:rPr lang="en-US" dirty="0" smtClean="0">
+              <a:rPr lang="en-US" dirty="0">
                 <a:solidFill>
                   <a:schemeClr val="bg1"/>
                 </a:solidFill>
@@ -4659,25 +4613,325 @@
           </a:bodyPr>
           <a:lstStyle/>
           <a:p>
-            <a:pPr marL="0" indent="0">
-              <a:buNone/>
-            </a:pPr>
-            <a:r>
-              <a:rPr lang="en-US" dirty="0" smtClean="0">
+            <a:r>
+              <a:rPr lang="en-US" dirty="0">
                 <a:solidFill>
                   <a:schemeClr val="bg1"/>
                 </a:solidFill>
               </a:rPr>
-              <a:t>Content</a:t>
-            </a:r>
-            <a:endParaRPr lang="en-US" dirty="0" smtClean="0">
+              <a:t>Generate design</a:t>
+            </a:r>
+          </a:p>
+          <a:p>
+            <a:r>
+              <a:rPr lang="en-US" dirty="0">
+                <a:solidFill>
+                  <a:schemeClr val="bg1"/>
+                </a:solidFill>
+              </a:rPr>
+              <a:t>Synthesis</a:t>
+            </a:r>
+          </a:p>
+          <a:p>
+            <a:r>
+              <a:rPr lang="en-US" dirty="0">
+                <a:solidFill>
+                  <a:schemeClr val="bg1"/>
+                </a:solidFill>
+              </a:rPr>
+              <a:t>Implementation</a:t>
+            </a:r>
+          </a:p>
+          <a:p>
+            <a:r>
+              <a:rPr lang="en-US" dirty="0">
+                <a:solidFill>
+                  <a:schemeClr val="bg1"/>
+                </a:solidFill>
+              </a:rPr>
+              <a:t>Bitstream Generation</a:t>
+            </a:r>
+          </a:p>
+          <a:p>
+            <a:r>
+              <a:rPr lang="en-US" dirty="0">
+                <a:solidFill>
+                  <a:schemeClr val="bg1"/>
+                </a:solidFill>
+              </a:rPr>
+              <a:t>Code Development</a:t>
+            </a:r>
+          </a:p>
+          <a:p>
+            <a:r>
+              <a:rPr lang="en-US" dirty="0">
+                <a:solidFill>
+                  <a:schemeClr val="bg1"/>
+                </a:solidFill>
+              </a:rPr>
+              <a:t>Linux Implementation</a:t>
+            </a:r>
+          </a:p>
+          <a:p>
+            <a:r>
+              <a:rPr lang="en-US" dirty="0">
+                <a:solidFill>
+                  <a:schemeClr val="bg1"/>
+                </a:solidFill>
+              </a:rPr>
+              <a:t>Concurrency Demonstration</a:t>
+            </a:r>
+          </a:p>
+          <a:p>
+            <a:r>
+              <a:rPr lang="en-US" dirty="0">
+                <a:solidFill>
+                  <a:schemeClr val="bg1"/>
+                </a:solidFill>
+              </a:rPr>
+              <a:t>Memes</a:t>
+            </a:r>
+          </a:p>
+          <a:p>
+            <a:endParaRPr lang="en-US" dirty="0">
               <a:solidFill>
                 <a:schemeClr val="bg1"/>
               </a:solidFill>
             </a:endParaRPr>
           </a:p>
           <a:p>
-            <a:endParaRPr lang="en-US" dirty="0" smtClean="0">
+            <a:endParaRPr lang="en-US" dirty="0"/>
+          </a:p>
+        </p:txBody>
+      </p:sp>
+    </p:spTree>
+    <p:extLst>
+      <p:ext uri="{BB962C8B-B14F-4D97-AF65-F5344CB8AC3E}">
+        <p14:creationId xmlns:p14="http://schemas.microsoft.com/office/powerpoint/2010/main" val="4141472309"/>
+      </p:ext>
+    </p:extLst>
+  </p:cSld>
+  <p:clrMapOvr>
+    <a:masterClrMapping/>
+  </p:clrMapOvr>
+</p:sld>
+</file>
+
+<file path=ppt/slides/slide7.xml><?xml version="1.0" encoding="utf-8"?>
+<p:sld xmlns:a="http://schemas.openxmlformats.org/drawingml/2006/main" xmlns:r="http://schemas.openxmlformats.org/officeDocument/2006/relationships" xmlns:p="http://schemas.openxmlformats.org/presentationml/2006/main">
+  <p:cSld>
+    <p:spTree>
+      <p:nvGrpSpPr>
+        <p:cNvPr id="1" name=""/>
+        <p:cNvGrpSpPr/>
+        <p:nvPr/>
+      </p:nvGrpSpPr>
+      <p:grpSpPr>
+        <a:xfrm>
+          <a:off x="0" y="0"/>
+          <a:ext cx="0" cy="0"/>
+          <a:chOff x="0" y="0"/>
+          <a:chExt cx="0" cy="0"/>
+        </a:xfrm>
+      </p:grpSpPr>
+      <p:pic>
+        <p:nvPicPr>
+          <p:cNvPr id="9" name="Picture 8">
+            <a:extLst>
+              <a:ext uri="{FF2B5EF4-FFF2-40B4-BE49-F238E27FC236}">
+                <a16:creationId xmlns:a16="http://schemas.microsoft.com/office/drawing/2014/main" id="{679700A4-E780-4213-B729-7D267E5EDE33}"/>
+              </a:ext>
+            </a:extLst>
+          </p:cNvPr>
+          <p:cNvPicPr>
+            <a:picLocks noChangeAspect="1"/>
+          </p:cNvPicPr>
+          <p:nvPr/>
+        </p:nvPicPr>
+        <p:blipFill>
+          <a:blip r:embed="rId2"/>
+          <a:stretch>
+            <a:fillRect/>
+          </a:stretch>
+        </p:blipFill>
+        <p:spPr>
+          <a:xfrm>
+            <a:off x="0" y="716069"/>
+            <a:ext cx="12192000" cy="5425861"/>
+          </a:xfrm>
+          <a:prstGeom prst="rect">
+            <a:avLst/>
+          </a:prstGeom>
+        </p:spPr>
+      </p:pic>
+    </p:spTree>
+    <p:extLst>
+      <p:ext uri="{BB962C8B-B14F-4D97-AF65-F5344CB8AC3E}">
+        <p14:creationId xmlns:p14="http://schemas.microsoft.com/office/powerpoint/2010/main" val="4103701261"/>
+      </p:ext>
+    </p:extLst>
+  </p:cSld>
+  <p:clrMapOvr>
+    <a:masterClrMapping/>
+  </p:clrMapOvr>
+</p:sld>
+</file>
+
+<file path=ppt/slides/slide8.xml><?xml version="1.0" encoding="utf-8"?>
+<p:sld xmlns:a="http://schemas.openxmlformats.org/drawingml/2006/main" xmlns:r="http://schemas.openxmlformats.org/officeDocument/2006/relationships" xmlns:p="http://schemas.openxmlformats.org/presentationml/2006/main">
+  <p:cSld>
+    <p:spTree>
+      <p:nvGrpSpPr>
+        <p:cNvPr id="1" name=""/>
+        <p:cNvGrpSpPr/>
+        <p:nvPr/>
+      </p:nvGrpSpPr>
+      <p:grpSpPr>
+        <a:xfrm>
+          <a:off x="0" y="0"/>
+          <a:ext cx="0" cy="0"/>
+          <a:chOff x="0" y="0"/>
+          <a:chExt cx="0" cy="0"/>
+        </a:xfrm>
+      </p:grpSpPr>
+      <p:pic>
+        <p:nvPicPr>
+          <p:cNvPr id="10" name="Picture 9" descr="A screenshot of a computer&#10;&#10;Description automatically generated">
+            <a:extLst>
+              <a:ext uri="{FF2B5EF4-FFF2-40B4-BE49-F238E27FC236}">
+                <a16:creationId xmlns:a16="http://schemas.microsoft.com/office/drawing/2014/main" id="{DD0CB721-F665-495F-A65F-6F8052FF30D6}"/>
+              </a:ext>
+            </a:extLst>
+          </p:cNvPr>
+          <p:cNvPicPr>
+            <a:picLocks noChangeAspect="1"/>
+          </p:cNvPicPr>
+          <p:nvPr/>
+        </p:nvPicPr>
+        <p:blipFill rotWithShape="1">
+          <a:blip r:embed="rId2">
+            <a:extLst>
+              <a:ext uri="{28A0092B-C50C-407E-A947-70E740481C1C}">
+                <a14:useLocalDpi xmlns:a14="http://schemas.microsoft.com/office/drawing/2010/main" val="0"/>
+              </a:ext>
+            </a:extLst>
+          </a:blip>
+          <a:srcRect r="26716" b="13955"/>
+          <a:stretch/>
+        </p:blipFill>
+        <p:spPr>
+          <a:xfrm>
+            <a:off x="0" y="0"/>
+            <a:ext cx="12192000" cy="6858000"/>
+          </a:xfrm>
+          <a:prstGeom prst="rect">
+            <a:avLst/>
+          </a:prstGeom>
+        </p:spPr>
+      </p:pic>
+    </p:spTree>
+    <p:extLst>
+      <p:ext uri="{BB962C8B-B14F-4D97-AF65-F5344CB8AC3E}">
+        <p14:creationId xmlns:p14="http://schemas.microsoft.com/office/powerpoint/2010/main" val="2698683575"/>
+      </p:ext>
+    </p:extLst>
+  </p:cSld>
+  <p:clrMapOvr>
+    <a:masterClrMapping/>
+  </p:clrMapOvr>
+</p:sld>
+</file>
+
+<file path=ppt/slides/slide9.xml><?xml version="1.0" encoding="utf-8"?>
+<p:sld xmlns:a="http://schemas.openxmlformats.org/drawingml/2006/main" xmlns:r="http://schemas.openxmlformats.org/officeDocument/2006/relationships" xmlns:p="http://schemas.openxmlformats.org/presentationml/2006/main">
+  <p:cSld>
+    <p:spTree>
+      <p:nvGrpSpPr>
+        <p:cNvPr id="1" name=""/>
+        <p:cNvGrpSpPr/>
+        <p:nvPr/>
+      </p:nvGrpSpPr>
+      <p:grpSpPr>
+        <a:xfrm>
+          <a:off x="0" y="0"/>
+          <a:ext cx="0" cy="0"/>
+          <a:chOff x="0" y="0"/>
+          <a:chExt cx="0" cy="0"/>
+        </a:xfrm>
+      </p:grpSpPr>
+      <p:sp>
+        <p:nvSpPr>
+          <p:cNvPr id="2" name="Title 1"/>
+          <p:cNvSpPr>
+            <a:spLocks noGrp="1"/>
+          </p:cNvSpPr>
+          <p:nvPr>
+            <p:ph type="title"/>
+          </p:nvPr>
+        </p:nvSpPr>
+        <p:spPr>
+          <a:xfrm>
+            <a:off x="838199" y="352978"/>
+            <a:ext cx="10515600" cy="1325563"/>
+          </a:xfrm>
+        </p:spPr>
+        <p:txBody>
+          <a:bodyPr/>
+          <a:lstStyle/>
+          <a:p>
+            <a:r>
+              <a:rPr lang="en-US" dirty="0">
+                <a:solidFill>
+                  <a:schemeClr val="bg1"/>
+                </a:solidFill>
+                <a:latin typeface="Acre Medium" panose="00000600000000000000" pitchFamily="50" charset="0"/>
+              </a:rPr>
+              <a:t>TITLE</a:t>
+            </a:r>
+            <a:endParaRPr lang="en-US" dirty="0">
+              <a:solidFill>
+                <a:schemeClr val="bg1"/>
+              </a:solidFill>
+            </a:endParaRPr>
+          </a:p>
+        </p:txBody>
+      </p:sp>
+      <p:sp>
+        <p:nvSpPr>
+          <p:cNvPr id="4" name="Content Placeholder 3"/>
+          <p:cNvSpPr>
+            <a:spLocks noGrp="1"/>
+          </p:cNvSpPr>
+          <p:nvPr>
+            <p:ph sz="half" idx="2"/>
+          </p:nvPr>
+        </p:nvSpPr>
+        <p:spPr>
+          <a:xfrm>
+            <a:off x="838201" y="1484768"/>
+            <a:ext cx="5649685" cy="4260939"/>
+          </a:xfrm>
+        </p:spPr>
+        <p:txBody>
+          <a:bodyPr>
+            <a:normAutofit/>
+          </a:bodyPr>
+          <a:lstStyle/>
+          <a:p>
+            <a:pPr marL="0" indent="0">
+              <a:buNone/>
+            </a:pPr>
+            <a:r>
+              <a:rPr lang="en-US" dirty="0">
+                <a:solidFill>
+                  <a:schemeClr val="bg1"/>
+                </a:solidFill>
+              </a:rPr>
+              <a:t>Content</a:t>
+            </a:r>
+          </a:p>
+          <a:p>
+            <a:endParaRPr lang="en-US" dirty="0">
               <a:solidFill>
                 <a:schemeClr val="bg1"/>
               </a:solidFill>
@@ -4895,18 +5149,13 @@
               </a:rPr>
               <a:t>Image from https://store.digilentinc.com/arty-a7-artix-7-fpga-development-board-for-makers-and-hobbyists/</a:t>
             </a:r>
-            <a:endParaRPr lang="en-US" sz="1200" i="1" dirty="0">
-              <a:solidFill>
-                <a:schemeClr val="bg1"/>
-              </a:solidFill>
-            </a:endParaRPr>
           </a:p>
         </p:txBody>
       </p:sp>
     </p:spTree>
     <p:extLst>
       <p:ext uri="{BB962C8B-B14F-4D97-AF65-F5344CB8AC3E}">
-        <p14:creationId xmlns:p14="http://schemas.microsoft.com/office/powerpoint/2010/main" val="4141472309"/>
+        <p14:creationId xmlns:p14="http://schemas.microsoft.com/office/powerpoint/2010/main" val="326881478"/>
       </p:ext>
     </p:extLst>
   </p:cSld>

</xml_diff>

<commit_message>
Added PSO velocity and position functions
</commit_message>
<xml_diff>
--- a/docs/CSCI460_Presentation.pptx
+++ b/docs/CSCI460_Presentation.pptx
@@ -496,7 +496,7 @@
           <a:p>
             <a:fld id="{2A6D1854-81C2-4FDA-8865-EF069E4E10D9}" type="datetimeFigureOut">
               <a:rPr lang="en-US" smtClean="0"/>
-              <a:t>12/3/2019</a:t>
+              <a:t>12/4/2019</a:t>
             </a:fld>
             <a:endParaRPr lang="en-US"/>
           </a:p>
@@ -664,7 +664,7 @@
           <a:p>
             <a:fld id="{2A6D1854-81C2-4FDA-8865-EF069E4E10D9}" type="datetimeFigureOut">
               <a:rPr lang="en-US" smtClean="0"/>
-              <a:t>12/3/2019</a:t>
+              <a:t>12/4/2019</a:t>
             </a:fld>
             <a:endParaRPr lang="en-US"/>
           </a:p>
@@ -842,7 +842,7 @@
           <a:p>
             <a:fld id="{2A6D1854-81C2-4FDA-8865-EF069E4E10D9}" type="datetimeFigureOut">
               <a:rPr lang="en-US" smtClean="0"/>
-              <a:t>12/3/2019</a:t>
+              <a:t>12/4/2019</a:t>
             </a:fld>
             <a:endParaRPr lang="en-US"/>
           </a:p>
@@ -1010,7 +1010,7 @@
           <a:p>
             <a:fld id="{2A6D1854-81C2-4FDA-8865-EF069E4E10D9}" type="datetimeFigureOut">
               <a:rPr lang="en-US" smtClean="0"/>
-              <a:t>12/3/2019</a:t>
+              <a:t>12/4/2019</a:t>
             </a:fld>
             <a:endParaRPr lang="en-US"/>
           </a:p>
@@ -1255,7 +1255,7 @@
           <a:p>
             <a:fld id="{2A6D1854-81C2-4FDA-8865-EF069E4E10D9}" type="datetimeFigureOut">
               <a:rPr lang="en-US" smtClean="0"/>
-              <a:t>12/3/2019</a:t>
+              <a:t>12/4/2019</a:t>
             </a:fld>
             <a:endParaRPr lang="en-US"/>
           </a:p>
@@ -1484,7 +1484,7 @@
           <a:p>
             <a:fld id="{2A6D1854-81C2-4FDA-8865-EF069E4E10D9}" type="datetimeFigureOut">
               <a:rPr lang="en-US" smtClean="0"/>
-              <a:t>12/3/2019</a:t>
+              <a:t>12/4/2019</a:t>
             </a:fld>
             <a:endParaRPr lang="en-US"/>
           </a:p>
@@ -1848,7 +1848,7 @@
           <a:p>
             <a:fld id="{2A6D1854-81C2-4FDA-8865-EF069E4E10D9}" type="datetimeFigureOut">
               <a:rPr lang="en-US" smtClean="0"/>
-              <a:t>12/3/2019</a:t>
+              <a:t>12/4/2019</a:t>
             </a:fld>
             <a:endParaRPr lang="en-US"/>
           </a:p>
@@ -1965,7 +1965,7 @@
           <a:p>
             <a:fld id="{2A6D1854-81C2-4FDA-8865-EF069E4E10D9}" type="datetimeFigureOut">
               <a:rPr lang="en-US" smtClean="0"/>
-              <a:t>12/3/2019</a:t>
+              <a:t>12/4/2019</a:t>
             </a:fld>
             <a:endParaRPr lang="en-US"/>
           </a:p>
@@ -2060,7 +2060,7 @@
           <a:p>
             <a:fld id="{2A6D1854-81C2-4FDA-8865-EF069E4E10D9}" type="datetimeFigureOut">
               <a:rPr lang="en-US" smtClean="0"/>
-              <a:t>12/3/2019</a:t>
+              <a:t>12/4/2019</a:t>
             </a:fld>
             <a:endParaRPr lang="en-US"/>
           </a:p>
@@ -2335,7 +2335,7 @@
           <a:p>
             <a:fld id="{2A6D1854-81C2-4FDA-8865-EF069E4E10D9}" type="datetimeFigureOut">
               <a:rPr lang="en-US" smtClean="0"/>
-              <a:t>12/3/2019</a:t>
+              <a:t>12/4/2019</a:t>
             </a:fld>
             <a:endParaRPr lang="en-US"/>
           </a:p>
@@ -2587,7 +2587,7 @@
           <a:p>
             <a:fld id="{2A6D1854-81C2-4FDA-8865-EF069E4E10D9}" type="datetimeFigureOut">
               <a:rPr lang="en-US" smtClean="0"/>
-              <a:t>12/3/2019</a:t>
+              <a:t>12/4/2019</a:t>
             </a:fld>
             <a:endParaRPr lang="en-US"/>
           </a:p>
@@ -2804,7 +2804,7 @@
           <a:p>
             <a:fld id="{2A6D1854-81C2-4FDA-8865-EF069E4E10D9}" type="datetimeFigureOut">
               <a:rPr lang="en-US" smtClean="0"/>
-              <a:t>12/3/2019</a:t>
+              <a:t>12/4/2019</a:t>
             </a:fld>
             <a:endParaRPr lang="en-US"/>
           </a:p>
@@ -4624,7 +4624,7 @@
         </p:blipFill>
         <p:spPr>
           <a:xfrm>
-            <a:off x="8120958" y="1814356"/>
+            <a:off x="8212398" y="1678541"/>
             <a:ext cx="2979345" cy="2979345"/>
           </a:xfrm>
           <a:prstGeom prst="rect">

</xml_diff>

<commit_message>
Petalinux is running, MCS verified.
</commit_message>
<xml_diff>
--- a/docs/CSCI460_Presentation.pptx
+++ b/docs/CSCI460_Presentation.pptx
@@ -11,15 +11,9 @@
     <p:sldId id="311" r:id="rId5"/>
     <p:sldId id="312" r:id="rId6"/>
     <p:sldId id="313" r:id="rId7"/>
-    <p:sldId id="322" r:id="rId8"/>
-    <p:sldId id="315" r:id="rId9"/>
-    <p:sldId id="314" r:id="rId10"/>
-    <p:sldId id="321" r:id="rId11"/>
-    <p:sldId id="318" r:id="rId12"/>
-    <p:sldId id="317" r:id="rId13"/>
-    <p:sldId id="319" r:id="rId14"/>
-    <p:sldId id="316" r:id="rId15"/>
-    <p:sldId id="320" r:id="rId16"/>
+    <p:sldId id="315" r:id="rId8"/>
+    <p:sldId id="314" r:id="rId9"/>
+    <p:sldId id="316" r:id="rId10"/>
   </p:sldIdLst>
   <p:sldSz cx="12192000" cy="6858000"/>
   <p:notesSz cx="6858000" cy="9144000"/>
@@ -129,15 +123,9 @@
             <p14:sldId id="311"/>
             <p14:sldId id="312"/>
             <p14:sldId id="313"/>
-            <p14:sldId id="322"/>
             <p14:sldId id="315"/>
             <p14:sldId id="314"/>
-            <p14:sldId id="321"/>
-            <p14:sldId id="318"/>
-            <p14:sldId id="317"/>
-            <p14:sldId id="319"/>
             <p14:sldId id="316"/>
-            <p14:sldId id="320"/>
           </p14:sldIdLst>
         </p14:section>
       </p14:sectionLst>
@@ -498,7 +486,7 @@
           <a:p>
             <a:fld id="{2A6D1854-81C2-4FDA-8865-EF069E4E10D9}" type="datetimeFigureOut">
               <a:rPr lang="en-US" smtClean="0"/>
-              <a:t>12/4/2019</a:t>
+              <a:t>11/21/2019</a:t>
             </a:fld>
             <a:endParaRPr lang="en-US"/>
           </a:p>
@@ -666,7 +654,7 @@
           <a:p>
             <a:fld id="{2A6D1854-81C2-4FDA-8865-EF069E4E10D9}" type="datetimeFigureOut">
               <a:rPr lang="en-US" smtClean="0"/>
-              <a:t>12/4/2019</a:t>
+              <a:t>11/21/2019</a:t>
             </a:fld>
             <a:endParaRPr lang="en-US"/>
           </a:p>
@@ -844,7 +832,7 @@
           <a:p>
             <a:fld id="{2A6D1854-81C2-4FDA-8865-EF069E4E10D9}" type="datetimeFigureOut">
               <a:rPr lang="en-US" smtClean="0"/>
-              <a:t>12/4/2019</a:t>
+              <a:t>11/21/2019</a:t>
             </a:fld>
             <a:endParaRPr lang="en-US"/>
           </a:p>
@@ -1012,7 +1000,7 @@
           <a:p>
             <a:fld id="{2A6D1854-81C2-4FDA-8865-EF069E4E10D9}" type="datetimeFigureOut">
               <a:rPr lang="en-US" smtClean="0"/>
-              <a:t>12/4/2019</a:t>
+              <a:t>11/21/2019</a:t>
             </a:fld>
             <a:endParaRPr lang="en-US"/>
           </a:p>
@@ -1257,7 +1245,7 @@
           <a:p>
             <a:fld id="{2A6D1854-81C2-4FDA-8865-EF069E4E10D9}" type="datetimeFigureOut">
               <a:rPr lang="en-US" smtClean="0"/>
-              <a:t>12/4/2019</a:t>
+              <a:t>11/21/2019</a:t>
             </a:fld>
             <a:endParaRPr lang="en-US"/>
           </a:p>
@@ -1486,7 +1474,7 @@
           <a:p>
             <a:fld id="{2A6D1854-81C2-4FDA-8865-EF069E4E10D9}" type="datetimeFigureOut">
               <a:rPr lang="en-US" smtClean="0"/>
-              <a:t>12/4/2019</a:t>
+              <a:t>11/21/2019</a:t>
             </a:fld>
             <a:endParaRPr lang="en-US"/>
           </a:p>
@@ -1850,7 +1838,7 @@
           <a:p>
             <a:fld id="{2A6D1854-81C2-4FDA-8865-EF069E4E10D9}" type="datetimeFigureOut">
               <a:rPr lang="en-US" smtClean="0"/>
-              <a:t>12/4/2019</a:t>
+              <a:t>11/21/2019</a:t>
             </a:fld>
             <a:endParaRPr lang="en-US"/>
           </a:p>
@@ -1967,7 +1955,7 @@
           <a:p>
             <a:fld id="{2A6D1854-81C2-4FDA-8865-EF069E4E10D9}" type="datetimeFigureOut">
               <a:rPr lang="en-US" smtClean="0"/>
-              <a:t>12/4/2019</a:t>
+              <a:t>11/21/2019</a:t>
             </a:fld>
             <a:endParaRPr lang="en-US"/>
           </a:p>
@@ -2062,7 +2050,7 @@
           <a:p>
             <a:fld id="{2A6D1854-81C2-4FDA-8865-EF069E4E10D9}" type="datetimeFigureOut">
               <a:rPr lang="en-US" smtClean="0"/>
-              <a:t>12/4/2019</a:t>
+              <a:t>11/21/2019</a:t>
             </a:fld>
             <a:endParaRPr lang="en-US"/>
           </a:p>
@@ -2337,7 +2325,7 @@
           <a:p>
             <a:fld id="{2A6D1854-81C2-4FDA-8865-EF069E4E10D9}" type="datetimeFigureOut">
               <a:rPr lang="en-US" smtClean="0"/>
-              <a:t>12/4/2019</a:t>
+              <a:t>11/21/2019</a:t>
             </a:fld>
             <a:endParaRPr lang="en-US"/>
           </a:p>
@@ -2589,7 +2577,7 @@
           <a:p>
             <a:fld id="{2A6D1854-81C2-4FDA-8865-EF069E4E10D9}" type="datetimeFigureOut">
               <a:rPr lang="en-US" smtClean="0"/>
-              <a:t>12/4/2019</a:t>
+              <a:t>11/21/2019</a:t>
             </a:fld>
             <a:endParaRPr lang="en-US"/>
           </a:p>
@@ -2806,7 +2794,7 @@
           <a:p>
             <a:fld id="{2A6D1854-81C2-4FDA-8865-EF069E4E10D9}" type="datetimeFigureOut">
               <a:rPr lang="en-US" smtClean="0"/>
-              <a:t>12/4/2019</a:t>
+              <a:t>11/21/2019</a:t>
             </a:fld>
             <a:endParaRPr lang="en-US"/>
           </a:p>
@@ -3299,818 +3287,6 @@
 </p:sld>
 </file>
 
-<file path=ppt/slides/slide10.xml><?xml version="1.0" encoding="utf-8"?>
-<p:sld xmlns:a="http://schemas.openxmlformats.org/drawingml/2006/main" xmlns:r="http://schemas.openxmlformats.org/officeDocument/2006/relationships" xmlns:p="http://schemas.openxmlformats.org/presentationml/2006/main">
-  <p:cSld>
-    <p:spTree>
-      <p:nvGrpSpPr>
-        <p:cNvPr id="1" name=""/>
-        <p:cNvGrpSpPr/>
-        <p:nvPr/>
-      </p:nvGrpSpPr>
-      <p:grpSpPr>
-        <a:xfrm>
-          <a:off x="0" y="0"/>
-          <a:ext cx="0" cy="0"/>
-          <a:chOff x="0" y="0"/>
-          <a:chExt cx="0" cy="0"/>
-        </a:xfrm>
-      </p:grpSpPr>
-      <p:pic>
-        <p:nvPicPr>
-          <p:cNvPr id="2" name="Picture 1"/>
-          <p:cNvPicPr>
-            <a:picLocks noChangeAspect="1"/>
-          </p:cNvPicPr>
-          <p:nvPr/>
-        </p:nvPicPr>
-        <p:blipFill>
-          <a:blip r:embed="rId2">
-            <a:extLst>
-              <a:ext uri="{28A0092B-C50C-407E-A947-70E740481C1C}">
-                <a14:useLocalDpi xmlns:a14="http://schemas.microsoft.com/office/drawing/2010/main" val="0"/>
-              </a:ext>
-            </a:extLst>
-          </a:blip>
-          <a:stretch>
-            <a:fillRect/>
-          </a:stretch>
-        </p:blipFill>
-        <p:spPr>
-          <a:xfrm>
-            <a:off x="1607908" y="1444317"/>
-            <a:ext cx="8976185" cy="5042504"/>
-          </a:xfrm>
-          <a:prstGeom prst="rect">
-            <a:avLst/>
-          </a:prstGeom>
-        </p:spPr>
-      </p:pic>
-      <p:sp>
-        <p:nvSpPr>
-          <p:cNvPr id="3" name="Title 1"/>
-          <p:cNvSpPr>
-            <a:spLocks noGrp="1"/>
-          </p:cNvSpPr>
-          <p:nvPr>
-            <p:ph type="title"/>
-          </p:nvPr>
-        </p:nvSpPr>
-        <p:spPr>
-          <a:xfrm>
-            <a:off x="838199" y="352978"/>
-            <a:ext cx="10515600" cy="1325563"/>
-          </a:xfrm>
-        </p:spPr>
-        <p:txBody>
-          <a:bodyPr/>
-          <a:lstStyle/>
-          <a:p>
-            <a:r>
-              <a:rPr lang="en-US" dirty="0" smtClean="0">
-                <a:solidFill>
-                  <a:schemeClr val="bg1"/>
-                </a:solidFill>
-                <a:latin typeface="Acre Medium" panose="00000600000000000000" pitchFamily="50" charset="0"/>
-              </a:rPr>
-              <a:t>CREATE PETALINUX PROJECT</a:t>
-            </a:r>
-            <a:endParaRPr lang="en-US" dirty="0">
-              <a:solidFill>
-                <a:schemeClr val="bg1"/>
-              </a:solidFill>
-            </a:endParaRPr>
-          </a:p>
-        </p:txBody>
-      </p:sp>
-    </p:spTree>
-    <p:extLst>
-      <p:ext uri="{BB962C8B-B14F-4D97-AF65-F5344CB8AC3E}">
-        <p14:creationId xmlns:p14="http://schemas.microsoft.com/office/powerpoint/2010/main" val="4209440176"/>
-      </p:ext>
-    </p:extLst>
-  </p:cSld>
-  <p:clrMapOvr>
-    <a:masterClrMapping/>
-  </p:clrMapOvr>
-</p:sld>
-</file>
-
-<file path=ppt/slides/slide11.xml><?xml version="1.0" encoding="utf-8"?>
-<p:sld xmlns:a="http://schemas.openxmlformats.org/drawingml/2006/main" xmlns:r="http://schemas.openxmlformats.org/officeDocument/2006/relationships" xmlns:p="http://schemas.openxmlformats.org/presentationml/2006/main">
-  <p:cSld>
-    <p:spTree>
-      <p:nvGrpSpPr>
-        <p:cNvPr id="1" name=""/>
-        <p:cNvGrpSpPr/>
-        <p:nvPr/>
-      </p:nvGrpSpPr>
-      <p:grpSpPr>
-        <a:xfrm>
-          <a:off x="0" y="0"/>
-          <a:ext cx="0" cy="0"/>
-          <a:chOff x="0" y="0"/>
-          <a:chExt cx="0" cy="0"/>
-        </a:xfrm>
-      </p:grpSpPr>
-      <p:pic>
-        <p:nvPicPr>
-          <p:cNvPr id="3" name="Picture 2"/>
-          <p:cNvPicPr>
-            <a:picLocks noChangeAspect="1"/>
-          </p:cNvPicPr>
-          <p:nvPr/>
-        </p:nvPicPr>
-        <p:blipFill>
-          <a:blip r:embed="rId2">
-            <a:extLst>
-              <a:ext uri="{28A0092B-C50C-407E-A947-70E740481C1C}">
-                <a14:useLocalDpi xmlns:a14="http://schemas.microsoft.com/office/drawing/2010/main" val="0"/>
-              </a:ext>
-            </a:extLst>
-          </a:blip>
-          <a:stretch>
-            <a:fillRect/>
-          </a:stretch>
-        </p:blipFill>
-        <p:spPr>
-          <a:xfrm>
-            <a:off x="1259310" y="1412609"/>
-            <a:ext cx="9673378" cy="5137820"/>
-          </a:xfrm>
-          <a:prstGeom prst="rect">
-            <a:avLst/>
-          </a:prstGeom>
-        </p:spPr>
-      </p:pic>
-      <p:sp>
-        <p:nvSpPr>
-          <p:cNvPr id="4" name="Title 1"/>
-          <p:cNvSpPr>
-            <a:spLocks noGrp="1"/>
-          </p:cNvSpPr>
-          <p:nvPr>
-            <p:ph type="title"/>
-          </p:nvPr>
-        </p:nvSpPr>
-        <p:spPr>
-          <a:xfrm>
-            <a:off x="838199" y="352978"/>
-            <a:ext cx="10515600" cy="1325563"/>
-          </a:xfrm>
-        </p:spPr>
-        <p:txBody>
-          <a:bodyPr/>
-          <a:lstStyle/>
-          <a:p>
-            <a:r>
-              <a:rPr lang="en-US" dirty="0" smtClean="0">
-                <a:solidFill>
-                  <a:schemeClr val="bg1"/>
-                </a:solidFill>
-                <a:latin typeface="Acre Medium" panose="00000600000000000000" pitchFamily="50" charset="0"/>
-              </a:rPr>
-              <a:t>CONFIGURE PETALINUX</a:t>
-            </a:r>
-            <a:endParaRPr lang="en-US" dirty="0">
-              <a:solidFill>
-                <a:schemeClr val="bg1"/>
-              </a:solidFill>
-            </a:endParaRPr>
-          </a:p>
-        </p:txBody>
-      </p:sp>
-    </p:spTree>
-    <p:extLst>
-      <p:ext uri="{BB962C8B-B14F-4D97-AF65-F5344CB8AC3E}">
-        <p14:creationId xmlns:p14="http://schemas.microsoft.com/office/powerpoint/2010/main" val="3057717496"/>
-      </p:ext>
-    </p:extLst>
-  </p:cSld>
-  <p:clrMapOvr>
-    <a:masterClrMapping/>
-  </p:clrMapOvr>
-</p:sld>
-</file>
-
-<file path=ppt/slides/slide12.xml><?xml version="1.0" encoding="utf-8"?>
-<p:sld xmlns:a="http://schemas.openxmlformats.org/drawingml/2006/main" xmlns:r="http://schemas.openxmlformats.org/officeDocument/2006/relationships" xmlns:p="http://schemas.openxmlformats.org/presentationml/2006/main">
-  <p:cSld>
-    <p:spTree>
-      <p:nvGrpSpPr>
-        <p:cNvPr id="1" name=""/>
-        <p:cNvGrpSpPr/>
-        <p:nvPr/>
-      </p:nvGrpSpPr>
-      <p:grpSpPr>
-        <a:xfrm>
-          <a:off x="0" y="0"/>
-          <a:ext cx="0" cy="0"/>
-          <a:chOff x="0" y="0"/>
-          <a:chExt cx="0" cy="0"/>
-        </a:xfrm>
-      </p:grpSpPr>
-      <p:pic>
-        <p:nvPicPr>
-          <p:cNvPr id="2" name="Picture 1"/>
-          <p:cNvPicPr>
-            <a:picLocks noChangeAspect="1"/>
-          </p:cNvPicPr>
-          <p:nvPr/>
-        </p:nvPicPr>
-        <p:blipFill>
-          <a:blip r:embed="rId2">
-            <a:extLst>
-              <a:ext uri="{28A0092B-C50C-407E-A947-70E740481C1C}">
-                <a14:useLocalDpi xmlns:a14="http://schemas.microsoft.com/office/drawing/2010/main" val="0"/>
-              </a:ext>
-            </a:extLst>
-          </a:blip>
-          <a:stretch>
-            <a:fillRect/>
-          </a:stretch>
-        </p:blipFill>
-        <p:spPr>
-          <a:xfrm>
-            <a:off x="1375755" y="1579968"/>
-            <a:ext cx="9440488" cy="5031548"/>
-          </a:xfrm>
-          <a:prstGeom prst="rect">
-            <a:avLst/>
-          </a:prstGeom>
-        </p:spPr>
-      </p:pic>
-      <p:sp>
-        <p:nvSpPr>
-          <p:cNvPr id="3" name="Title 1"/>
-          <p:cNvSpPr>
-            <a:spLocks noGrp="1"/>
-          </p:cNvSpPr>
-          <p:nvPr>
-            <p:ph type="title"/>
-          </p:nvPr>
-        </p:nvSpPr>
-        <p:spPr>
-          <a:xfrm>
-            <a:off x="838199" y="352978"/>
-            <a:ext cx="10515600" cy="1325563"/>
-          </a:xfrm>
-        </p:spPr>
-        <p:txBody>
-          <a:bodyPr/>
-          <a:lstStyle/>
-          <a:p>
-            <a:r>
-              <a:rPr lang="en-US" dirty="0" smtClean="0">
-                <a:solidFill>
-                  <a:schemeClr val="bg1"/>
-                </a:solidFill>
-                <a:latin typeface="Acre Medium" panose="00000600000000000000" pitchFamily="50" charset="0"/>
-              </a:rPr>
-              <a:t>BUILD PETALINUX IMAGE</a:t>
-            </a:r>
-            <a:endParaRPr lang="en-US" dirty="0">
-              <a:solidFill>
-                <a:schemeClr val="bg1"/>
-              </a:solidFill>
-            </a:endParaRPr>
-          </a:p>
-        </p:txBody>
-      </p:sp>
-    </p:spTree>
-    <p:extLst>
-      <p:ext uri="{BB962C8B-B14F-4D97-AF65-F5344CB8AC3E}">
-        <p14:creationId xmlns:p14="http://schemas.microsoft.com/office/powerpoint/2010/main" val="418559451"/>
-      </p:ext>
-    </p:extLst>
-  </p:cSld>
-  <p:clrMapOvr>
-    <a:masterClrMapping/>
-  </p:clrMapOvr>
-</p:sld>
-</file>
-
-<file path=ppt/slides/slide13.xml><?xml version="1.0" encoding="utf-8"?>
-<p:sld xmlns:a="http://schemas.openxmlformats.org/drawingml/2006/main" xmlns:r="http://schemas.openxmlformats.org/officeDocument/2006/relationships" xmlns:p="http://schemas.openxmlformats.org/presentationml/2006/main">
-  <p:cSld>
-    <p:spTree>
-      <p:nvGrpSpPr>
-        <p:cNvPr id="1" name=""/>
-        <p:cNvGrpSpPr/>
-        <p:nvPr/>
-      </p:nvGrpSpPr>
-      <p:grpSpPr>
-        <a:xfrm>
-          <a:off x="0" y="0"/>
-          <a:ext cx="0" cy="0"/>
-          <a:chOff x="0" y="0"/>
-          <a:chExt cx="0" cy="0"/>
-        </a:xfrm>
-      </p:grpSpPr>
-      <p:pic>
-        <p:nvPicPr>
-          <p:cNvPr id="3" name="Picture 2"/>
-          <p:cNvPicPr>
-            <a:picLocks noChangeAspect="1"/>
-          </p:cNvPicPr>
-          <p:nvPr/>
-        </p:nvPicPr>
-        <p:blipFill>
-          <a:blip r:embed="rId2">
-            <a:extLst>
-              <a:ext uri="{28A0092B-C50C-407E-A947-70E740481C1C}">
-                <a14:useLocalDpi xmlns:a14="http://schemas.microsoft.com/office/drawing/2010/main" val="0"/>
-              </a:ext>
-            </a:extLst>
-          </a:blip>
-          <a:stretch>
-            <a:fillRect/>
-          </a:stretch>
-        </p:blipFill>
-        <p:spPr>
-          <a:xfrm>
-            <a:off x="1350818" y="1423781"/>
-            <a:ext cx="9490362" cy="5141598"/>
-          </a:xfrm>
-          <a:prstGeom prst="rect">
-            <a:avLst/>
-          </a:prstGeom>
-        </p:spPr>
-      </p:pic>
-      <p:sp>
-        <p:nvSpPr>
-          <p:cNvPr id="4" name="Title 1"/>
-          <p:cNvSpPr>
-            <a:spLocks noGrp="1"/>
-          </p:cNvSpPr>
-          <p:nvPr>
-            <p:ph type="title"/>
-          </p:nvPr>
-        </p:nvSpPr>
-        <p:spPr>
-          <a:xfrm>
-            <a:off x="838199" y="352978"/>
-            <a:ext cx="10515600" cy="1325563"/>
-          </a:xfrm>
-        </p:spPr>
-        <p:txBody>
-          <a:bodyPr/>
-          <a:lstStyle/>
-          <a:p>
-            <a:r>
-              <a:rPr lang="en-US" dirty="0" smtClean="0">
-                <a:solidFill>
-                  <a:schemeClr val="bg1"/>
-                </a:solidFill>
-                <a:latin typeface="Acre Medium" panose="00000600000000000000" pitchFamily="50" charset="0"/>
-              </a:rPr>
-              <a:t>BOOT</a:t>
-            </a:r>
-            <a:endParaRPr lang="en-US" dirty="0">
-              <a:solidFill>
-                <a:schemeClr val="bg1"/>
-              </a:solidFill>
-            </a:endParaRPr>
-          </a:p>
-        </p:txBody>
-      </p:sp>
-    </p:spTree>
-    <p:extLst>
-      <p:ext uri="{BB962C8B-B14F-4D97-AF65-F5344CB8AC3E}">
-        <p14:creationId xmlns:p14="http://schemas.microsoft.com/office/powerpoint/2010/main" val="2412044776"/>
-      </p:ext>
-    </p:extLst>
-  </p:cSld>
-  <p:clrMapOvr>
-    <a:masterClrMapping/>
-  </p:clrMapOvr>
-</p:sld>
-</file>
-
-<file path=ppt/slides/slide14.xml><?xml version="1.0" encoding="utf-8"?>
-<p:sld xmlns:a="http://schemas.openxmlformats.org/drawingml/2006/main" xmlns:r="http://schemas.openxmlformats.org/officeDocument/2006/relationships" xmlns:p="http://schemas.openxmlformats.org/presentationml/2006/main">
-  <p:cSld>
-    <p:spTree>
-      <p:nvGrpSpPr>
-        <p:cNvPr id="1" name=""/>
-        <p:cNvGrpSpPr/>
-        <p:nvPr/>
-      </p:nvGrpSpPr>
-      <p:grpSpPr>
-        <a:xfrm>
-          <a:off x="0" y="0"/>
-          <a:ext cx="0" cy="0"/>
-          <a:chOff x="0" y="0"/>
-          <a:chExt cx="0" cy="0"/>
-        </a:xfrm>
-      </p:grpSpPr>
-      <p:sp>
-        <p:nvSpPr>
-          <p:cNvPr id="2" name="Title 1"/>
-          <p:cNvSpPr>
-            <a:spLocks noGrp="1"/>
-          </p:cNvSpPr>
-          <p:nvPr>
-            <p:ph type="title"/>
-          </p:nvPr>
-        </p:nvSpPr>
-        <p:spPr>
-          <a:xfrm>
-            <a:off x="838199" y="352978"/>
-            <a:ext cx="10515600" cy="1325563"/>
-          </a:xfrm>
-        </p:spPr>
-        <p:txBody>
-          <a:bodyPr/>
-          <a:lstStyle/>
-          <a:p>
-            <a:r>
-              <a:rPr lang="en-US" dirty="0" smtClean="0">
-                <a:solidFill>
-                  <a:schemeClr val="bg1"/>
-                </a:solidFill>
-                <a:latin typeface="Acre Medium" panose="00000600000000000000" pitchFamily="50" charset="0"/>
-              </a:rPr>
-              <a:t>DEMO</a:t>
-            </a:r>
-            <a:endParaRPr lang="en-US" dirty="0">
-              <a:solidFill>
-                <a:schemeClr val="bg1"/>
-              </a:solidFill>
-            </a:endParaRPr>
-          </a:p>
-        </p:txBody>
-      </p:sp>
-      <p:sp>
-        <p:nvSpPr>
-          <p:cNvPr id="4" name="Content Placeholder 3"/>
-          <p:cNvSpPr>
-            <a:spLocks noGrp="1"/>
-          </p:cNvSpPr>
-          <p:nvPr>
-            <p:ph sz="half" idx="2"/>
-          </p:nvPr>
-        </p:nvSpPr>
-        <p:spPr>
-          <a:xfrm>
-            <a:off x="838201" y="1484768"/>
-            <a:ext cx="5649685" cy="4260939"/>
-          </a:xfrm>
-        </p:spPr>
-        <p:txBody>
-          <a:bodyPr>
-            <a:normAutofit/>
-          </a:bodyPr>
-          <a:lstStyle/>
-          <a:p>
-            <a:pPr marL="0" indent="0">
-              <a:buNone/>
-            </a:pPr>
-            <a:r>
-              <a:rPr lang="en-US" dirty="0" smtClean="0">
-                <a:solidFill>
-                  <a:schemeClr val="bg1"/>
-                </a:solidFill>
-              </a:rPr>
-              <a:t>Stand by for SSH …</a:t>
-            </a:r>
-            <a:endParaRPr lang="en-US" dirty="0">
-              <a:solidFill>
-                <a:schemeClr val="bg1"/>
-              </a:solidFill>
-            </a:endParaRPr>
-          </a:p>
-          <a:p>
-            <a:endParaRPr lang="en-US" dirty="0">
-              <a:solidFill>
-                <a:schemeClr val="bg1"/>
-              </a:solidFill>
-            </a:endParaRPr>
-          </a:p>
-          <a:p>
-            <a:endParaRPr lang="en-US" dirty="0">
-              <a:solidFill>
-                <a:schemeClr val="bg1"/>
-              </a:solidFill>
-            </a:endParaRPr>
-          </a:p>
-          <a:p>
-            <a:endParaRPr lang="en-US" dirty="0"/>
-          </a:p>
-        </p:txBody>
-      </p:sp>
-    </p:spTree>
-    <p:extLst>
-      <p:ext uri="{BB962C8B-B14F-4D97-AF65-F5344CB8AC3E}">
-        <p14:creationId xmlns:p14="http://schemas.microsoft.com/office/powerpoint/2010/main" val="326881478"/>
-      </p:ext>
-    </p:extLst>
-  </p:cSld>
-  <p:clrMapOvr>
-    <a:masterClrMapping/>
-  </p:clrMapOvr>
-</p:sld>
-</file>
-
-<file path=ppt/slides/slide15.xml><?xml version="1.0" encoding="utf-8"?>
-<p:sld xmlns:a="http://schemas.openxmlformats.org/drawingml/2006/main" xmlns:r="http://schemas.openxmlformats.org/officeDocument/2006/relationships" xmlns:p="http://schemas.openxmlformats.org/presentationml/2006/main">
-  <p:cSld>
-    <p:spTree>
-      <p:nvGrpSpPr>
-        <p:cNvPr id="1" name=""/>
-        <p:cNvGrpSpPr/>
-        <p:nvPr/>
-      </p:nvGrpSpPr>
-      <p:grpSpPr>
-        <a:xfrm>
-          <a:off x="0" y="0"/>
-          <a:ext cx="0" cy="0"/>
-          <a:chOff x="0" y="0"/>
-          <a:chExt cx="0" cy="0"/>
-        </a:xfrm>
-      </p:grpSpPr>
-      <p:sp>
-        <p:nvSpPr>
-          <p:cNvPr id="2" name="Title 1"/>
-          <p:cNvSpPr>
-            <a:spLocks noGrp="1"/>
-          </p:cNvSpPr>
-          <p:nvPr>
-            <p:ph type="title"/>
-          </p:nvPr>
-        </p:nvSpPr>
-        <p:spPr>
-          <a:xfrm>
-            <a:off x="838199" y="352978"/>
-            <a:ext cx="10515600" cy="1325563"/>
-          </a:xfrm>
-        </p:spPr>
-        <p:txBody>
-          <a:bodyPr/>
-          <a:lstStyle/>
-          <a:p>
-            <a:r>
-              <a:rPr lang="en-US" dirty="0" smtClean="0">
-                <a:solidFill>
-                  <a:schemeClr val="bg1"/>
-                </a:solidFill>
-                <a:latin typeface="Acre Medium" panose="00000600000000000000" pitchFamily="50" charset="0"/>
-              </a:rPr>
-              <a:t>GIT REPO</a:t>
-            </a:r>
-            <a:endParaRPr lang="en-US" dirty="0">
-              <a:solidFill>
-                <a:schemeClr val="bg1"/>
-              </a:solidFill>
-            </a:endParaRPr>
-          </a:p>
-        </p:txBody>
-      </p:sp>
-      <p:sp>
-        <p:nvSpPr>
-          <p:cNvPr id="5" name="Content Placeholder 2">
-            <a:extLst>
-              <a:ext uri="{FF2B5EF4-FFF2-40B4-BE49-F238E27FC236}">
-                <a16:creationId xmlns:a16="http://schemas.microsoft.com/office/drawing/2014/main" id="{CBFC3969-20BF-4C6B-A851-5B2D5DD60D43}"/>
-              </a:ext>
-            </a:extLst>
-          </p:cNvPr>
-          <p:cNvSpPr txBox="1">
-            <a:spLocks/>
-          </p:cNvSpPr>
-          <p:nvPr/>
-        </p:nvSpPr>
-        <p:spPr>
-          <a:xfrm>
-            <a:off x="838200" y="6255945"/>
-            <a:ext cx="10515600" cy="271603"/>
-          </a:xfrm>
-          <a:prstGeom prst="rect">
-            <a:avLst/>
-          </a:prstGeom>
-        </p:spPr>
-        <p:txBody>
-          <a:bodyPr vert="horz" lIns="91440" tIns="45720" rIns="91440" bIns="45720" rtlCol="0">
-            <a:noAutofit/>
-          </a:bodyPr>
-          <a:lstStyle>
-            <a:lvl1pPr marL="0" indent="0" algn="ctr" defTabSz="914400" rtl="0" eaLnBrk="1" latinLnBrk="0" hangingPunct="1">
-              <a:lnSpc>
-                <a:spcPct val="90000"/>
-              </a:lnSpc>
-              <a:spcBef>
-                <a:spcPts val="1000"/>
-              </a:spcBef>
-              <a:buFont typeface="Arial" panose="020B0604020202020204" pitchFamily="34" charset="0"/>
-              <a:buNone/>
-              <a:defRPr sz="2400" kern="1200">
-                <a:solidFill>
-                  <a:schemeClr val="tx1"/>
-                </a:solidFill>
-                <a:latin typeface="+mn-lt"/>
-                <a:ea typeface="+mn-ea"/>
-                <a:cs typeface="+mn-cs"/>
-              </a:defRPr>
-            </a:lvl1pPr>
-            <a:lvl2pPr marL="457200" indent="0" algn="ctr" defTabSz="914400" rtl="0" eaLnBrk="1" latinLnBrk="0" hangingPunct="1">
-              <a:lnSpc>
-                <a:spcPct val="90000"/>
-              </a:lnSpc>
-              <a:spcBef>
-                <a:spcPts val="500"/>
-              </a:spcBef>
-              <a:buFont typeface="Arial" panose="020B0604020202020204" pitchFamily="34" charset="0"/>
-              <a:buNone/>
-              <a:defRPr sz="2000" kern="1200">
-                <a:solidFill>
-                  <a:schemeClr val="tx1"/>
-                </a:solidFill>
-                <a:latin typeface="+mn-lt"/>
-                <a:ea typeface="+mn-ea"/>
-                <a:cs typeface="+mn-cs"/>
-              </a:defRPr>
-            </a:lvl2pPr>
-            <a:lvl3pPr marL="914400" indent="0" algn="ctr" defTabSz="914400" rtl="0" eaLnBrk="1" latinLnBrk="0" hangingPunct="1">
-              <a:lnSpc>
-                <a:spcPct val="90000"/>
-              </a:lnSpc>
-              <a:spcBef>
-                <a:spcPts val="500"/>
-              </a:spcBef>
-              <a:buFont typeface="Arial" panose="020B0604020202020204" pitchFamily="34" charset="0"/>
-              <a:buNone/>
-              <a:defRPr sz="1800" kern="1200">
-                <a:solidFill>
-                  <a:schemeClr val="tx1"/>
-                </a:solidFill>
-                <a:latin typeface="+mn-lt"/>
-                <a:ea typeface="+mn-ea"/>
-                <a:cs typeface="+mn-cs"/>
-              </a:defRPr>
-            </a:lvl3pPr>
-            <a:lvl4pPr marL="1371600" indent="0" algn="ctr" defTabSz="914400" rtl="0" eaLnBrk="1" latinLnBrk="0" hangingPunct="1">
-              <a:lnSpc>
-                <a:spcPct val="90000"/>
-              </a:lnSpc>
-              <a:spcBef>
-                <a:spcPts val="500"/>
-              </a:spcBef>
-              <a:buFont typeface="Arial" panose="020B0604020202020204" pitchFamily="34" charset="0"/>
-              <a:buNone/>
-              <a:defRPr sz="1600" kern="1200">
-                <a:solidFill>
-                  <a:schemeClr val="tx1"/>
-                </a:solidFill>
-                <a:latin typeface="+mn-lt"/>
-                <a:ea typeface="+mn-ea"/>
-                <a:cs typeface="+mn-cs"/>
-              </a:defRPr>
-            </a:lvl4pPr>
-            <a:lvl5pPr marL="1828800" indent="0" algn="ctr" defTabSz="914400" rtl="0" eaLnBrk="1" latinLnBrk="0" hangingPunct="1">
-              <a:lnSpc>
-                <a:spcPct val="90000"/>
-              </a:lnSpc>
-              <a:spcBef>
-                <a:spcPts val="500"/>
-              </a:spcBef>
-              <a:buFont typeface="Arial" panose="020B0604020202020204" pitchFamily="34" charset="0"/>
-              <a:buNone/>
-              <a:defRPr sz="1600" kern="1200">
-                <a:solidFill>
-                  <a:schemeClr val="tx1"/>
-                </a:solidFill>
-                <a:latin typeface="+mn-lt"/>
-                <a:ea typeface="+mn-ea"/>
-                <a:cs typeface="+mn-cs"/>
-              </a:defRPr>
-            </a:lvl5pPr>
-            <a:lvl6pPr marL="2286000" indent="0" algn="ctr" defTabSz="914400" rtl="0" eaLnBrk="1" latinLnBrk="0" hangingPunct="1">
-              <a:lnSpc>
-                <a:spcPct val="90000"/>
-              </a:lnSpc>
-              <a:spcBef>
-                <a:spcPts val="500"/>
-              </a:spcBef>
-              <a:buFont typeface="Arial" panose="020B0604020202020204" pitchFamily="34" charset="0"/>
-              <a:buNone/>
-              <a:defRPr sz="1600" kern="1200">
-                <a:solidFill>
-                  <a:schemeClr val="tx1"/>
-                </a:solidFill>
-                <a:latin typeface="+mn-lt"/>
-                <a:ea typeface="+mn-ea"/>
-                <a:cs typeface="+mn-cs"/>
-              </a:defRPr>
-            </a:lvl6pPr>
-            <a:lvl7pPr marL="2743200" indent="0" algn="ctr" defTabSz="914400" rtl="0" eaLnBrk="1" latinLnBrk="0" hangingPunct="1">
-              <a:lnSpc>
-                <a:spcPct val="90000"/>
-              </a:lnSpc>
-              <a:spcBef>
-                <a:spcPts val="500"/>
-              </a:spcBef>
-              <a:buFont typeface="Arial" panose="020B0604020202020204" pitchFamily="34" charset="0"/>
-              <a:buNone/>
-              <a:defRPr sz="1600" kern="1200">
-                <a:solidFill>
-                  <a:schemeClr val="tx1"/>
-                </a:solidFill>
-                <a:latin typeface="+mn-lt"/>
-                <a:ea typeface="+mn-ea"/>
-                <a:cs typeface="+mn-cs"/>
-              </a:defRPr>
-            </a:lvl7pPr>
-            <a:lvl8pPr marL="3200400" indent="0" algn="ctr" defTabSz="914400" rtl="0" eaLnBrk="1" latinLnBrk="0" hangingPunct="1">
-              <a:lnSpc>
-                <a:spcPct val="90000"/>
-              </a:lnSpc>
-              <a:spcBef>
-                <a:spcPts val="500"/>
-              </a:spcBef>
-              <a:buFont typeface="Arial" panose="020B0604020202020204" pitchFamily="34" charset="0"/>
-              <a:buNone/>
-              <a:defRPr sz="1600" kern="1200">
-                <a:solidFill>
-                  <a:schemeClr val="tx1"/>
-                </a:solidFill>
-                <a:latin typeface="+mn-lt"/>
-                <a:ea typeface="+mn-ea"/>
-                <a:cs typeface="+mn-cs"/>
-              </a:defRPr>
-            </a:lvl8pPr>
-            <a:lvl9pPr marL="3657600" indent="0" algn="ctr" defTabSz="914400" rtl="0" eaLnBrk="1" latinLnBrk="0" hangingPunct="1">
-              <a:lnSpc>
-                <a:spcPct val="90000"/>
-              </a:lnSpc>
-              <a:spcBef>
-                <a:spcPts val="500"/>
-              </a:spcBef>
-              <a:buFont typeface="Arial" panose="020B0604020202020204" pitchFamily="34" charset="0"/>
-              <a:buNone/>
-              <a:defRPr sz="1600" kern="1200">
-                <a:solidFill>
-                  <a:schemeClr val="tx1"/>
-                </a:solidFill>
-                <a:latin typeface="+mn-lt"/>
-                <a:ea typeface="+mn-ea"/>
-                <a:cs typeface="+mn-cs"/>
-              </a:defRPr>
-            </a:lvl9pPr>
-          </a:lstStyle>
-          <a:p>
-            <a:r>
-              <a:rPr lang="en-US" sz="1200" i="1" dirty="0">
-                <a:solidFill>
-                  <a:schemeClr val="bg1"/>
-                </a:solidFill>
-              </a:rPr>
-              <a:t>https://github.com/chrismajor2124/CSCI460_Final_Project_Yocto_on_Microblaze</a:t>
-            </a:r>
-            <a:endParaRPr lang="en-US" sz="1200" i="1" dirty="0">
-              <a:solidFill>
-                <a:schemeClr val="bg1"/>
-              </a:solidFill>
-            </a:endParaRPr>
-          </a:p>
-        </p:txBody>
-      </p:sp>
-      <p:pic>
-        <p:nvPicPr>
-          <p:cNvPr id="6" name="Picture 5"/>
-          <p:cNvPicPr>
-            <a:picLocks noChangeAspect="1"/>
-          </p:cNvPicPr>
-          <p:nvPr/>
-        </p:nvPicPr>
-        <p:blipFill>
-          <a:blip r:embed="rId2"/>
-          <a:stretch>
-            <a:fillRect/>
-          </a:stretch>
-        </p:blipFill>
-        <p:spPr>
-          <a:xfrm>
-            <a:off x="2359774" y="1458445"/>
-            <a:ext cx="7472449" cy="4340201"/>
-          </a:xfrm>
-          <a:prstGeom prst="rect">
-            <a:avLst/>
-          </a:prstGeom>
-        </p:spPr>
-      </p:pic>
-    </p:spTree>
-    <p:extLst>
-      <p:ext uri="{BB962C8B-B14F-4D97-AF65-F5344CB8AC3E}">
-        <p14:creationId xmlns:p14="http://schemas.microsoft.com/office/powerpoint/2010/main" val="2504178133"/>
-      </p:ext>
-    </p:extLst>
-  </p:cSld>
-  <p:clrMapOvr>
-    <a:masterClrMapping/>
-  </p:clrMapOvr>
-</p:sld>
-</file>
-
 <file path=ppt/slides/slide2.xml><?xml version="1.0" encoding="utf-8"?>
 <p:sld xmlns:a="http://schemas.openxmlformats.org/drawingml/2006/main" xmlns:r="http://schemas.openxmlformats.org/officeDocument/2006/relationships" xmlns:p="http://schemas.openxmlformats.org/presentationml/2006/main">
   <p:cSld>
@@ -4612,7 +3788,7 @@
         </p:blipFill>
         <p:spPr>
           <a:xfrm>
-            <a:off x="8212398" y="1678541"/>
+            <a:off x="8120958" y="1814356"/>
             <a:ext cx="2979345" cy="2979345"/>
           </a:xfrm>
           <a:prstGeom prst="rect">
@@ -4745,31 +3921,8 @@
                   <a:schemeClr val="bg1"/>
                 </a:solidFill>
               </a:rPr>
-              <a:t>GPIO for additional </a:t>
-            </a:r>
-            <a:r>
-              <a:rPr lang="en-US" dirty="0" smtClean="0">
-                <a:solidFill>
-                  <a:schemeClr val="bg1"/>
-                </a:solidFill>
-              </a:rPr>
-              <a:t>functionality</a:t>
-            </a:r>
-          </a:p>
-          <a:p>
-            <a:r>
-              <a:rPr lang="en-US" dirty="0" smtClean="0">
-                <a:solidFill>
-                  <a:schemeClr val="bg1"/>
-                </a:solidFill>
-              </a:rPr>
-              <a:t>QSPI Flash and DDR3L Memory</a:t>
-            </a:r>
-            <a:endParaRPr lang="en-US" dirty="0">
-              <a:solidFill>
-                <a:schemeClr val="bg1"/>
-              </a:solidFill>
-            </a:endParaRPr>
+              <a:t>GPIO for additional functionality</a:t>
+            </a:r>
           </a:p>
           <a:p>
             <a:endParaRPr lang="en-US" dirty="0">
@@ -5422,13 +4575,13 @@
           <a:lstStyle/>
           <a:p>
             <a:r>
-              <a:rPr lang="en-US" dirty="0" smtClean="0">
+              <a:rPr lang="en-US" dirty="0">
                 <a:solidFill>
                   <a:schemeClr val="bg1"/>
                 </a:solidFill>
                 <a:latin typeface="Acre Medium" panose="00000600000000000000" pitchFamily="50" charset="0"/>
               </a:rPr>
-              <a:t>WORKFLOW</a:t>
+              <a:t>TITLE</a:t>
             </a:r>
             <a:endParaRPr lang="en-US" dirty="0">
               <a:solidFill>
@@ -5471,114 +4624,75 @@
           </a:p>
           <a:p>
             <a:r>
-              <a:rPr lang="en-US" dirty="0" err="1" smtClean="0">
+              <a:rPr lang="en-US" dirty="0">
                 <a:solidFill>
                   <a:schemeClr val="bg1"/>
                 </a:solidFill>
               </a:rPr>
-              <a:t>Bitstream</a:t>
-            </a:r>
-            <a:r>
-              <a:rPr lang="en-US" dirty="0" smtClean="0">
+              <a:t>Synthesis</a:t>
+            </a:r>
+          </a:p>
+          <a:p>
+            <a:r>
+              <a:rPr lang="en-US" dirty="0">
                 <a:solidFill>
                   <a:schemeClr val="bg1"/>
                 </a:solidFill>
               </a:rPr>
-              <a:t> </a:t>
-            </a:r>
+              <a:t>Implementation</a:t>
+            </a:r>
+          </a:p>
+          <a:p>
             <a:r>
               <a:rPr lang="en-US" dirty="0">
                 <a:solidFill>
                   <a:schemeClr val="bg1"/>
                 </a:solidFill>
               </a:rPr>
-              <a:t>Generation</a:t>
-            </a:r>
-          </a:p>
-          <a:p>
-            <a:r>
-              <a:rPr lang="en-US" dirty="0" smtClean="0">
+              <a:t>Bitstream Generation</a:t>
+            </a:r>
+          </a:p>
+          <a:p>
+            <a:r>
+              <a:rPr lang="en-US" dirty="0">
                 <a:solidFill>
                   <a:schemeClr val="bg1"/>
                 </a:solidFill>
               </a:rPr>
-              <a:t>Test Software</a:t>
-            </a:r>
-          </a:p>
-          <a:p>
-            <a:r>
-              <a:rPr lang="en-US" dirty="0" smtClean="0">
+              <a:t>Code Development</a:t>
+            </a:r>
+          </a:p>
+          <a:p>
+            <a:r>
+              <a:rPr lang="en-US" dirty="0">
                 <a:solidFill>
                   <a:schemeClr val="bg1"/>
                 </a:solidFill>
               </a:rPr>
-              <a:t>Create </a:t>
-            </a:r>
-            <a:r>
-              <a:rPr lang="en-US" dirty="0" err="1" smtClean="0">
+              <a:t>Linux Implementation</a:t>
+            </a:r>
+          </a:p>
+          <a:p>
+            <a:r>
+              <a:rPr lang="en-US" dirty="0">
                 <a:solidFill>
                   <a:schemeClr val="bg1"/>
                 </a:solidFill>
               </a:rPr>
-              <a:t>Petalinux</a:t>
-            </a:r>
-            <a:r>
-              <a:rPr lang="en-US" dirty="0" smtClean="0">
+              <a:t>Concurrency Demonstration</a:t>
+            </a:r>
+          </a:p>
+          <a:p>
+            <a:r>
+              <a:rPr lang="en-US" dirty="0">
                 <a:solidFill>
                   <a:schemeClr val="bg1"/>
                 </a:solidFill>
               </a:rPr>
-              <a:t> Project</a:t>
-            </a:r>
-          </a:p>
-          <a:p>
-            <a:r>
-              <a:rPr lang="en-US" dirty="0" smtClean="0">
-                <a:solidFill>
-                  <a:schemeClr val="bg1"/>
-                </a:solidFill>
-              </a:rPr>
-              <a:t>Configure </a:t>
-            </a:r>
-            <a:r>
-              <a:rPr lang="en-US" dirty="0" err="1" smtClean="0">
-                <a:solidFill>
-                  <a:schemeClr val="bg1"/>
-                </a:solidFill>
-              </a:rPr>
-              <a:t>Petalinux</a:t>
-            </a:r>
-            <a:endParaRPr lang="en-US" dirty="0" smtClean="0">
-              <a:solidFill>
-                <a:schemeClr val="bg1"/>
-              </a:solidFill>
-            </a:endParaRPr>
-          </a:p>
-          <a:p>
-            <a:r>
-              <a:rPr lang="en-US" dirty="0" smtClean="0">
-                <a:solidFill>
-                  <a:schemeClr val="bg1"/>
-                </a:solidFill>
-              </a:rPr>
-              <a:t>Build </a:t>
-            </a:r>
-            <a:r>
-              <a:rPr lang="en-US" dirty="0" err="1" smtClean="0">
-                <a:solidFill>
-                  <a:schemeClr val="bg1"/>
-                </a:solidFill>
-              </a:rPr>
-              <a:t>Petalinux</a:t>
-            </a:r>
-            <a:r>
-              <a:rPr lang="en-US" dirty="0" smtClean="0">
-                <a:solidFill>
-                  <a:schemeClr val="bg1"/>
-                </a:solidFill>
-              </a:rPr>
-              <a:t> Image</a:t>
-            </a:r>
+              <a:t>Memes</a:t>
+            </a:r>
+          </a:p>
+          <a:p>
             <a:endParaRPr lang="en-US" dirty="0">
               <a:solidFill>
                 <a:schemeClr val="bg1"/>
@@ -5586,77 +4700,10 @@
             </a:endParaRPr>
           </a:p>
           <a:p>
-            <a:r>
-              <a:rPr lang="en-US" dirty="0" smtClean="0">
-                <a:solidFill>
-                  <a:schemeClr val="bg1"/>
-                </a:solidFill>
-              </a:rPr>
-              <a:t>Boot</a:t>
-            </a:r>
-            <a:endParaRPr lang="en-US" dirty="0">
-              <a:solidFill>
-                <a:schemeClr val="bg1"/>
-              </a:solidFill>
-            </a:endParaRPr>
-          </a:p>
-          <a:p>
-            <a:r>
-              <a:rPr lang="en-US" dirty="0" smtClean="0">
-                <a:solidFill>
-                  <a:schemeClr val="bg1"/>
-                </a:solidFill>
-              </a:rPr>
-              <a:t>Demo</a:t>
-            </a:r>
-            <a:endParaRPr lang="en-US" dirty="0">
-              <a:solidFill>
-                <a:schemeClr val="bg1"/>
-              </a:solidFill>
-            </a:endParaRPr>
-          </a:p>
-          <a:p>
-            <a:endParaRPr lang="en-US" dirty="0">
-              <a:solidFill>
-                <a:schemeClr val="bg1"/>
-              </a:solidFill>
-            </a:endParaRPr>
-          </a:p>
-          <a:p>
             <a:endParaRPr lang="en-US" dirty="0"/>
           </a:p>
         </p:txBody>
       </p:sp>
-      <p:pic>
-        <p:nvPicPr>
-          <p:cNvPr id="3" name="Picture 2"/>
-          <p:cNvPicPr>
-            <a:picLocks noChangeAspect="1"/>
-          </p:cNvPicPr>
-          <p:nvPr/>
-        </p:nvPicPr>
-        <p:blipFill>
-          <a:blip r:embed="rId2">
-            <a:extLst>
-              <a:ext uri="{28A0092B-C50C-407E-A947-70E740481C1C}">
-                <a14:useLocalDpi xmlns:a14="http://schemas.microsoft.com/office/drawing/2010/main" val="0"/>
-              </a:ext>
-            </a:extLst>
-          </a:blip>
-          <a:stretch>
-            <a:fillRect/>
-          </a:stretch>
-        </p:blipFill>
-        <p:spPr>
-          <a:xfrm>
-            <a:off x="7027718" y="1733097"/>
-            <a:ext cx="4038600" cy="3764280"/>
-          </a:xfrm>
-          <a:prstGeom prst="rect">
-            <a:avLst/>
-          </a:prstGeom>
-        </p:spPr>
-      </p:pic>
     </p:spTree>
     <p:extLst>
       <p:ext uri="{BB962C8B-B14F-4D97-AF65-F5344CB8AC3E}">
@@ -5687,65 +4734,9 @@
           <a:chExt cx="0" cy="0"/>
         </a:xfrm>
       </p:grpSpPr>
-      <p:sp>
-        <p:nvSpPr>
-          <p:cNvPr id="2" name="Title 1"/>
-          <p:cNvSpPr>
-            <a:spLocks noGrp="1"/>
-          </p:cNvSpPr>
-          <p:nvPr>
-            <p:ph type="title"/>
-          </p:nvPr>
-        </p:nvSpPr>
-        <p:spPr>
-          <a:xfrm>
-            <a:off x="838199" y="352978"/>
-            <a:ext cx="10515600" cy="1325563"/>
-          </a:xfrm>
-        </p:spPr>
-        <p:txBody>
-          <a:bodyPr/>
-          <a:lstStyle/>
-          <a:p>
-            <a:r>
-              <a:rPr lang="en-US" dirty="0" smtClean="0">
-                <a:solidFill>
-                  <a:schemeClr val="bg1"/>
-                </a:solidFill>
-                <a:latin typeface="Acre Medium" panose="00000600000000000000" pitchFamily="50" charset="0"/>
-              </a:rPr>
-              <a:t>GENERATE DESIGN</a:t>
-            </a:r>
-            <a:endParaRPr lang="en-US" dirty="0">
-              <a:solidFill>
-                <a:schemeClr val="bg1"/>
-              </a:solidFill>
-            </a:endParaRPr>
-          </a:p>
-        </p:txBody>
-      </p:sp>
-      <p:sp>
-        <p:nvSpPr>
-          <p:cNvPr id="5" name="Content Placeholder 4"/>
-          <p:cNvSpPr>
-            <a:spLocks noGrp="1"/>
-          </p:cNvSpPr>
-          <p:nvPr>
-            <p:ph sz="half" idx="2"/>
-          </p:nvPr>
-        </p:nvSpPr>
-        <p:spPr/>
-        <p:txBody>
-          <a:bodyPr/>
-          <a:lstStyle/>
-          <a:p>
-            <a:endParaRPr lang="en-US"/>
-          </a:p>
-        </p:txBody>
-      </p:sp>
       <p:pic>
         <p:nvPicPr>
-          <p:cNvPr id="6" name="Picture 5">
+          <p:cNvPr id="9" name="Picture 8">
             <a:extLst>
               <a:ext uri="{FF2B5EF4-FFF2-40B4-BE49-F238E27FC236}">
                 <a16:creationId xmlns:a16="http://schemas.microsoft.com/office/drawing/2014/main" id="{679700A4-E780-4213-B729-7D267E5EDE33}"/>
@@ -5765,105 +4756,8 @@
         </p:blipFill>
         <p:spPr>
           <a:xfrm>
-            <a:off x="513672" y="1480840"/>
-            <a:ext cx="11164657" cy="4968658"/>
-          </a:xfrm>
-          <a:prstGeom prst="rect">
-            <a:avLst/>
-          </a:prstGeom>
-        </p:spPr>
-      </p:pic>
-    </p:spTree>
-    <p:extLst>
-      <p:ext uri="{BB962C8B-B14F-4D97-AF65-F5344CB8AC3E}">
-        <p14:creationId xmlns:p14="http://schemas.microsoft.com/office/powerpoint/2010/main" val="959977406"/>
-      </p:ext>
-    </p:extLst>
-  </p:cSld>
-  <p:clrMapOvr>
-    <a:masterClrMapping/>
-  </p:clrMapOvr>
-</p:sld>
-</file>
-
-<file path=ppt/slides/slide8.xml><?xml version="1.0" encoding="utf-8"?>
-<p:sld xmlns:a="http://schemas.openxmlformats.org/drawingml/2006/main" xmlns:r="http://schemas.openxmlformats.org/officeDocument/2006/relationships" xmlns:p="http://schemas.openxmlformats.org/presentationml/2006/main">
-  <p:cSld>
-    <p:spTree>
-      <p:nvGrpSpPr>
-        <p:cNvPr id="1" name=""/>
-        <p:cNvGrpSpPr/>
-        <p:nvPr/>
-      </p:nvGrpSpPr>
-      <p:grpSpPr>
-        <a:xfrm>
-          <a:off x="0" y="0"/>
-          <a:ext cx="0" cy="0"/>
-          <a:chOff x="0" y="0"/>
-          <a:chExt cx="0" cy="0"/>
-        </a:xfrm>
-      </p:grpSpPr>
-      <p:sp>
-        <p:nvSpPr>
-          <p:cNvPr id="3" name="Title 1"/>
-          <p:cNvSpPr>
-            <a:spLocks noGrp="1"/>
-          </p:cNvSpPr>
-          <p:nvPr>
-            <p:ph type="title"/>
-          </p:nvPr>
-        </p:nvSpPr>
-        <p:spPr>
-          <a:xfrm>
-            <a:off x="838199" y="352978"/>
-            <a:ext cx="10515600" cy="1325563"/>
-          </a:xfrm>
-        </p:spPr>
-        <p:txBody>
-          <a:bodyPr/>
-          <a:lstStyle/>
-          <a:p>
-            <a:r>
-              <a:rPr lang="en-US" dirty="0" smtClean="0">
-                <a:solidFill>
-                  <a:schemeClr val="bg1"/>
-                </a:solidFill>
-                <a:latin typeface="Acre Medium" panose="00000600000000000000" pitchFamily="50" charset="0"/>
-              </a:rPr>
-              <a:t>BITSTREAM GENERATION</a:t>
-            </a:r>
-            <a:endParaRPr lang="en-US" dirty="0">
-              <a:solidFill>
-                <a:schemeClr val="bg1"/>
-              </a:solidFill>
-            </a:endParaRPr>
-          </a:p>
-        </p:txBody>
-      </p:sp>
-      <p:pic>
-        <p:nvPicPr>
-          <p:cNvPr id="4" name="Picture 3"/>
-          <p:cNvPicPr>
-            <a:picLocks noChangeAspect="1"/>
-          </p:cNvPicPr>
-          <p:nvPr/>
-        </p:nvPicPr>
-        <p:blipFill>
-          <a:blip r:embed="rId2">
-            <a:extLst>
-              <a:ext uri="{28A0092B-C50C-407E-A947-70E740481C1C}">
-                <a14:useLocalDpi xmlns:a14="http://schemas.microsoft.com/office/drawing/2010/main" val="0"/>
-              </a:ext>
-            </a:extLst>
-          </a:blip>
-          <a:stretch>
-            <a:fillRect/>
-          </a:stretch>
-        </p:blipFill>
-        <p:spPr>
-          <a:xfrm>
-            <a:off x="4076700" y="1678541"/>
-            <a:ext cx="4038600" cy="3764280"/>
+            <a:off x="0" y="716069"/>
+            <a:ext cx="12192000" cy="5425861"/>
           </a:xfrm>
           <a:prstGeom prst="rect">
             <a:avLst/>
@@ -5883,7 +4777,7 @@
 </p:sld>
 </file>
 
-<file path=ppt/slides/slide9.xml><?xml version="1.0" encoding="utf-8"?>
+<file path=ppt/slides/slide8.xml><?xml version="1.0" encoding="utf-8"?>
 <p:sld xmlns:a="http://schemas.openxmlformats.org/drawingml/2006/main" xmlns:r="http://schemas.openxmlformats.org/officeDocument/2006/relationships" xmlns:p="http://schemas.openxmlformats.org/presentationml/2006/main">
   <p:cSld>
     <p:spTree>
@@ -5927,17 +4821,47 @@
         </p:blipFill>
         <p:spPr>
           <a:xfrm>
-            <a:off x="1528155" y="1434465"/>
-            <a:ext cx="9135688" cy="5138824"/>
+            <a:off x="0" y="0"/>
+            <a:ext cx="12192000" cy="6858000"/>
           </a:xfrm>
           <a:prstGeom prst="rect">
             <a:avLst/>
           </a:prstGeom>
         </p:spPr>
       </p:pic>
-      <p:sp>
-        <p:nvSpPr>
-          <p:cNvPr id="3" name="Title 1"/>
+    </p:spTree>
+    <p:extLst>
+      <p:ext uri="{BB962C8B-B14F-4D97-AF65-F5344CB8AC3E}">
+        <p14:creationId xmlns:p14="http://schemas.microsoft.com/office/powerpoint/2010/main" val="2698683575"/>
+      </p:ext>
+    </p:extLst>
+  </p:cSld>
+  <p:clrMapOvr>
+    <a:masterClrMapping/>
+  </p:clrMapOvr>
+</p:sld>
+</file>
+
+<file path=ppt/slides/slide9.xml><?xml version="1.0" encoding="utf-8"?>
+<p:sld xmlns:a="http://schemas.openxmlformats.org/drawingml/2006/main" xmlns:r="http://schemas.openxmlformats.org/officeDocument/2006/relationships" xmlns:p="http://schemas.openxmlformats.org/presentationml/2006/main">
+  <p:cSld>
+    <p:spTree>
+      <p:nvGrpSpPr>
+        <p:cNvPr id="1" name=""/>
+        <p:cNvGrpSpPr/>
+        <p:nvPr/>
+      </p:nvGrpSpPr>
+      <p:grpSpPr>
+        <a:xfrm>
+          <a:off x="0" y="0"/>
+          <a:ext cx="0" cy="0"/>
+          <a:chOff x="0" y="0"/>
+          <a:chExt cx="0" cy="0"/>
+        </a:xfrm>
+      </p:grpSpPr>
+      <p:sp>
+        <p:nvSpPr>
+          <p:cNvPr id="2" name="Title 1"/>
           <p:cNvSpPr>
             <a:spLocks noGrp="1"/>
           </p:cNvSpPr>
@@ -5956,13 +4880,13 @@
           <a:lstStyle/>
           <a:p>
             <a:r>
-              <a:rPr lang="en-US" dirty="0" smtClean="0">
+              <a:rPr lang="en-US" dirty="0">
                 <a:solidFill>
                   <a:schemeClr val="bg1"/>
                 </a:solidFill>
                 <a:latin typeface="Acre Medium" panose="00000600000000000000" pitchFamily="50" charset="0"/>
               </a:rPr>
-              <a:t>TEST SOFTWARE</a:t>
+              <a:t>TITLE</a:t>
             </a:r>
             <a:endParaRPr lang="en-US" dirty="0">
               <a:solidFill>
@@ -5972,10 +4896,266 @@
           </a:p>
         </p:txBody>
       </p:sp>
+      <p:sp>
+        <p:nvSpPr>
+          <p:cNvPr id="4" name="Content Placeholder 3"/>
+          <p:cNvSpPr>
+            <a:spLocks noGrp="1"/>
+          </p:cNvSpPr>
+          <p:nvPr>
+            <p:ph sz="half" idx="2"/>
+          </p:nvPr>
+        </p:nvSpPr>
+        <p:spPr>
+          <a:xfrm>
+            <a:off x="838201" y="1484768"/>
+            <a:ext cx="5649685" cy="4260939"/>
+          </a:xfrm>
+        </p:spPr>
+        <p:txBody>
+          <a:bodyPr>
+            <a:normAutofit/>
+          </a:bodyPr>
+          <a:lstStyle/>
+          <a:p>
+            <a:pPr marL="0" indent="0">
+              <a:buNone/>
+            </a:pPr>
+            <a:r>
+              <a:rPr lang="en-US" dirty="0">
+                <a:solidFill>
+                  <a:schemeClr val="bg1"/>
+                </a:solidFill>
+              </a:rPr>
+              <a:t>Content</a:t>
+            </a:r>
+          </a:p>
+          <a:p>
+            <a:endParaRPr lang="en-US" dirty="0">
+              <a:solidFill>
+                <a:schemeClr val="bg1"/>
+              </a:solidFill>
+            </a:endParaRPr>
+          </a:p>
+          <a:p>
+            <a:endParaRPr lang="en-US" dirty="0">
+              <a:solidFill>
+                <a:schemeClr val="bg1"/>
+              </a:solidFill>
+            </a:endParaRPr>
+          </a:p>
+          <a:p>
+            <a:endParaRPr lang="en-US" dirty="0"/>
+          </a:p>
+        </p:txBody>
+      </p:sp>
+      <p:sp>
+        <p:nvSpPr>
+          <p:cNvPr id="5" name="Content Placeholder 2">
+            <a:extLst>
+              <a:ext uri="{FF2B5EF4-FFF2-40B4-BE49-F238E27FC236}">
+                <a16:creationId xmlns:a16="http://schemas.microsoft.com/office/drawing/2014/main" id="{CBFC3969-20BF-4C6B-A851-5B2D5DD60D43}"/>
+              </a:ext>
+            </a:extLst>
+          </p:cNvPr>
+          <p:cNvSpPr txBox="1">
+            <a:spLocks/>
+          </p:cNvSpPr>
+          <p:nvPr/>
+        </p:nvSpPr>
+        <p:spPr>
+          <a:xfrm>
+            <a:off x="838200" y="6255945"/>
+            <a:ext cx="10515600" cy="271603"/>
+          </a:xfrm>
+          <a:prstGeom prst="rect">
+            <a:avLst/>
+          </a:prstGeom>
+        </p:spPr>
+        <p:txBody>
+          <a:bodyPr vert="horz" lIns="91440" tIns="45720" rIns="91440" bIns="45720" rtlCol="0">
+            <a:noAutofit/>
+          </a:bodyPr>
+          <a:lstStyle>
+            <a:lvl1pPr marL="0" indent="0" algn="ctr" defTabSz="914400" rtl="0" eaLnBrk="1" latinLnBrk="0" hangingPunct="1">
+              <a:lnSpc>
+                <a:spcPct val="90000"/>
+              </a:lnSpc>
+              <a:spcBef>
+                <a:spcPts val="1000"/>
+              </a:spcBef>
+              <a:buFont typeface="Arial" panose="020B0604020202020204" pitchFamily="34" charset="0"/>
+              <a:buNone/>
+              <a:defRPr sz="2400" kern="1200">
+                <a:solidFill>
+                  <a:schemeClr val="tx1"/>
+                </a:solidFill>
+                <a:latin typeface="+mn-lt"/>
+                <a:ea typeface="+mn-ea"/>
+                <a:cs typeface="+mn-cs"/>
+              </a:defRPr>
+            </a:lvl1pPr>
+            <a:lvl2pPr marL="457200" indent="0" algn="ctr" defTabSz="914400" rtl="0" eaLnBrk="1" latinLnBrk="0" hangingPunct="1">
+              <a:lnSpc>
+                <a:spcPct val="90000"/>
+              </a:lnSpc>
+              <a:spcBef>
+                <a:spcPts val="500"/>
+              </a:spcBef>
+              <a:buFont typeface="Arial" panose="020B0604020202020204" pitchFamily="34" charset="0"/>
+              <a:buNone/>
+              <a:defRPr sz="2000" kern="1200">
+                <a:solidFill>
+                  <a:schemeClr val="tx1"/>
+                </a:solidFill>
+                <a:latin typeface="+mn-lt"/>
+                <a:ea typeface="+mn-ea"/>
+                <a:cs typeface="+mn-cs"/>
+              </a:defRPr>
+            </a:lvl2pPr>
+            <a:lvl3pPr marL="914400" indent="0" algn="ctr" defTabSz="914400" rtl="0" eaLnBrk="1" latinLnBrk="0" hangingPunct="1">
+              <a:lnSpc>
+                <a:spcPct val="90000"/>
+              </a:lnSpc>
+              <a:spcBef>
+                <a:spcPts val="500"/>
+              </a:spcBef>
+              <a:buFont typeface="Arial" panose="020B0604020202020204" pitchFamily="34" charset="0"/>
+              <a:buNone/>
+              <a:defRPr sz="1800" kern="1200">
+                <a:solidFill>
+                  <a:schemeClr val="tx1"/>
+                </a:solidFill>
+                <a:latin typeface="+mn-lt"/>
+                <a:ea typeface="+mn-ea"/>
+                <a:cs typeface="+mn-cs"/>
+              </a:defRPr>
+            </a:lvl3pPr>
+            <a:lvl4pPr marL="1371600" indent="0" algn="ctr" defTabSz="914400" rtl="0" eaLnBrk="1" latinLnBrk="0" hangingPunct="1">
+              <a:lnSpc>
+                <a:spcPct val="90000"/>
+              </a:lnSpc>
+              <a:spcBef>
+                <a:spcPts val="500"/>
+              </a:spcBef>
+              <a:buFont typeface="Arial" panose="020B0604020202020204" pitchFamily="34" charset="0"/>
+              <a:buNone/>
+              <a:defRPr sz="1600" kern="1200">
+                <a:solidFill>
+                  <a:schemeClr val="tx1"/>
+                </a:solidFill>
+                <a:latin typeface="+mn-lt"/>
+                <a:ea typeface="+mn-ea"/>
+                <a:cs typeface="+mn-cs"/>
+              </a:defRPr>
+            </a:lvl4pPr>
+            <a:lvl5pPr marL="1828800" indent="0" algn="ctr" defTabSz="914400" rtl="0" eaLnBrk="1" latinLnBrk="0" hangingPunct="1">
+              <a:lnSpc>
+                <a:spcPct val="90000"/>
+              </a:lnSpc>
+              <a:spcBef>
+                <a:spcPts val="500"/>
+              </a:spcBef>
+              <a:buFont typeface="Arial" panose="020B0604020202020204" pitchFamily="34" charset="0"/>
+              <a:buNone/>
+              <a:defRPr sz="1600" kern="1200">
+                <a:solidFill>
+                  <a:schemeClr val="tx1"/>
+                </a:solidFill>
+                <a:latin typeface="+mn-lt"/>
+                <a:ea typeface="+mn-ea"/>
+                <a:cs typeface="+mn-cs"/>
+              </a:defRPr>
+            </a:lvl5pPr>
+            <a:lvl6pPr marL="2286000" indent="0" algn="ctr" defTabSz="914400" rtl="0" eaLnBrk="1" latinLnBrk="0" hangingPunct="1">
+              <a:lnSpc>
+                <a:spcPct val="90000"/>
+              </a:lnSpc>
+              <a:spcBef>
+                <a:spcPts val="500"/>
+              </a:spcBef>
+              <a:buFont typeface="Arial" panose="020B0604020202020204" pitchFamily="34" charset="0"/>
+              <a:buNone/>
+              <a:defRPr sz="1600" kern="1200">
+                <a:solidFill>
+                  <a:schemeClr val="tx1"/>
+                </a:solidFill>
+                <a:latin typeface="+mn-lt"/>
+                <a:ea typeface="+mn-ea"/>
+                <a:cs typeface="+mn-cs"/>
+              </a:defRPr>
+            </a:lvl6pPr>
+            <a:lvl7pPr marL="2743200" indent="0" algn="ctr" defTabSz="914400" rtl="0" eaLnBrk="1" latinLnBrk="0" hangingPunct="1">
+              <a:lnSpc>
+                <a:spcPct val="90000"/>
+              </a:lnSpc>
+              <a:spcBef>
+                <a:spcPts val="500"/>
+              </a:spcBef>
+              <a:buFont typeface="Arial" panose="020B0604020202020204" pitchFamily="34" charset="0"/>
+              <a:buNone/>
+              <a:defRPr sz="1600" kern="1200">
+                <a:solidFill>
+                  <a:schemeClr val="tx1"/>
+                </a:solidFill>
+                <a:latin typeface="+mn-lt"/>
+                <a:ea typeface="+mn-ea"/>
+                <a:cs typeface="+mn-cs"/>
+              </a:defRPr>
+            </a:lvl7pPr>
+            <a:lvl8pPr marL="3200400" indent="0" algn="ctr" defTabSz="914400" rtl="0" eaLnBrk="1" latinLnBrk="0" hangingPunct="1">
+              <a:lnSpc>
+                <a:spcPct val="90000"/>
+              </a:lnSpc>
+              <a:spcBef>
+                <a:spcPts val="500"/>
+              </a:spcBef>
+              <a:buFont typeface="Arial" panose="020B0604020202020204" pitchFamily="34" charset="0"/>
+              <a:buNone/>
+              <a:defRPr sz="1600" kern="1200">
+                <a:solidFill>
+                  <a:schemeClr val="tx1"/>
+                </a:solidFill>
+                <a:latin typeface="+mn-lt"/>
+                <a:ea typeface="+mn-ea"/>
+                <a:cs typeface="+mn-cs"/>
+              </a:defRPr>
+            </a:lvl8pPr>
+            <a:lvl9pPr marL="3657600" indent="0" algn="ctr" defTabSz="914400" rtl="0" eaLnBrk="1" latinLnBrk="0" hangingPunct="1">
+              <a:lnSpc>
+                <a:spcPct val="90000"/>
+              </a:lnSpc>
+              <a:spcBef>
+                <a:spcPts val="500"/>
+              </a:spcBef>
+              <a:buFont typeface="Arial" panose="020B0604020202020204" pitchFamily="34" charset="0"/>
+              <a:buNone/>
+              <a:defRPr sz="1600" kern="1200">
+                <a:solidFill>
+                  <a:schemeClr val="tx1"/>
+                </a:solidFill>
+                <a:latin typeface="+mn-lt"/>
+                <a:ea typeface="+mn-ea"/>
+                <a:cs typeface="+mn-cs"/>
+              </a:defRPr>
+            </a:lvl9pPr>
+          </a:lstStyle>
+          <a:p>
+            <a:r>
+              <a:rPr lang="en-US" sz="1200" i="1" dirty="0">
+                <a:solidFill>
+                  <a:schemeClr val="bg1"/>
+                </a:solidFill>
+              </a:rPr>
+              <a:t>Image from https://store.digilentinc.com/arty-a7-artix-7-fpga-development-board-for-makers-and-hobbyists/</a:t>
+            </a:r>
+          </a:p>
+        </p:txBody>
+      </p:sp>
     </p:spTree>
     <p:extLst>
       <p:ext uri="{BB962C8B-B14F-4D97-AF65-F5344CB8AC3E}">
-        <p14:creationId xmlns:p14="http://schemas.microsoft.com/office/powerpoint/2010/main" val="2698683575"/>
+        <p14:creationId xmlns:p14="http://schemas.microsoft.com/office/powerpoint/2010/main" val="326881478"/>
       </p:ext>
     </p:extLst>
   </p:cSld>

</xml_diff>

<commit_message>
Backup of final report documentation added
</commit_message>
<xml_diff>
--- a/docs/CSCI460_Presentation.pptx
+++ b/docs/CSCI460_Presentation.pptx
@@ -19,7 +19,8 @@
     <p:sldId id="317" r:id="rId13"/>
     <p:sldId id="319" r:id="rId14"/>
     <p:sldId id="316" r:id="rId15"/>
-    <p:sldId id="320" r:id="rId16"/>
+    <p:sldId id="323" r:id="rId16"/>
+    <p:sldId id="320" r:id="rId17"/>
   </p:sldIdLst>
   <p:sldSz cx="12192000" cy="6858000"/>
   <p:notesSz cx="6858000" cy="9144000"/>
@@ -137,6 +138,7 @@
             <p14:sldId id="317"/>
             <p14:sldId id="319"/>
             <p14:sldId id="316"/>
+            <p14:sldId id="323"/>
             <p14:sldId id="320"/>
           </p14:sldIdLst>
         </p14:section>
@@ -498,7 +500,7 @@
           <a:p>
             <a:fld id="{2A6D1854-81C2-4FDA-8865-EF069E4E10D9}" type="datetimeFigureOut">
               <a:rPr lang="en-US" smtClean="0"/>
-              <a:t>12/4/2019</a:t>
+              <a:t>12/6/2019</a:t>
             </a:fld>
             <a:endParaRPr lang="en-US"/>
           </a:p>
@@ -666,7 +668,7 @@
           <a:p>
             <a:fld id="{2A6D1854-81C2-4FDA-8865-EF069E4E10D9}" type="datetimeFigureOut">
               <a:rPr lang="en-US" smtClean="0"/>
-              <a:t>12/4/2019</a:t>
+              <a:t>12/6/2019</a:t>
             </a:fld>
             <a:endParaRPr lang="en-US"/>
           </a:p>
@@ -844,7 +846,7 @@
           <a:p>
             <a:fld id="{2A6D1854-81C2-4FDA-8865-EF069E4E10D9}" type="datetimeFigureOut">
               <a:rPr lang="en-US" smtClean="0"/>
-              <a:t>12/4/2019</a:t>
+              <a:t>12/6/2019</a:t>
             </a:fld>
             <a:endParaRPr lang="en-US"/>
           </a:p>
@@ -1012,7 +1014,7 @@
           <a:p>
             <a:fld id="{2A6D1854-81C2-4FDA-8865-EF069E4E10D9}" type="datetimeFigureOut">
               <a:rPr lang="en-US" smtClean="0"/>
-              <a:t>12/4/2019</a:t>
+              <a:t>12/6/2019</a:t>
             </a:fld>
             <a:endParaRPr lang="en-US"/>
           </a:p>
@@ -1257,7 +1259,7 @@
           <a:p>
             <a:fld id="{2A6D1854-81C2-4FDA-8865-EF069E4E10D9}" type="datetimeFigureOut">
               <a:rPr lang="en-US" smtClean="0"/>
-              <a:t>12/4/2019</a:t>
+              <a:t>12/6/2019</a:t>
             </a:fld>
             <a:endParaRPr lang="en-US"/>
           </a:p>
@@ -1486,7 +1488,7 @@
           <a:p>
             <a:fld id="{2A6D1854-81C2-4FDA-8865-EF069E4E10D9}" type="datetimeFigureOut">
               <a:rPr lang="en-US" smtClean="0"/>
-              <a:t>12/4/2019</a:t>
+              <a:t>12/6/2019</a:t>
             </a:fld>
             <a:endParaRPr lang="en-US"/>
           </a:p>
@@ -1850,7 +1852,7 @@
           <a:p>
             <a:fld id="{2A6D1854-81C2-4FDA-8865-EF069E4E10D9}" type="datetimeFigureOut">
               <a:rPr lang="en-US" smtClean="0"/>
-              <a:t>12/4/2019</a:t>
+              <a:t>12/6/2019</a:t>
             </a:fld>
             <a:endParaRPr lang="en-US"/>
           </a:p>
@@ -1967,7 +1969,7 @@
           <a:p>
             <a:fld id="{2A6D1854-81C2-4FDA-8865-EF069E4E10D9}" type="datetimeFigureOut">
               <a:rPr lang="en-US" smtClean="0"/>
-              <a:t>12/4/2019</a:t>
+              <a:t>12/6/2019</a:t>
             </a:fld>
             <a:endParaRPr lang="en-US"/>
           </a:p>
@@ -2062,7 +2064,7 @@
           <a:p>
             <a:fld id="{2A6D1854-81C2-4FDA-8865-EF069E4E10D9}" type="datetimeFigureOut">
               <a:rPr lang="en-US" smtClean="0"/>
-              <a:t>12/4/2019</a:t>
+              <a:t>12/6/2019</a:t>
             </a:fld>
             <a:endParaRPr lang="en-US"/>
           </a:p>
@@ -2337,7 +2339,7 @@
           <a:p>
             <a:fld id="{2A6D1854-81C2-4FDA-8865-EF069E4E10D9}" type="datetimeFigureOut">
               <a:rPr lang="en-US" smtClean="0"/>
-              <a:t>12/4/2019</a:t>
+              <a:t>12/6/2019</a:t>
             </a:fld>
             <a:endParaRPr lang="en-US"/>
           </a:p>
@@ -2589,7 +2591,7 @@
           <a:p>
             <a:fld id="{2A6D1854-81C2-4FDA-8865-EF069E4E10D9}" type="datetimeFigureOut">
               <a:rPr lang="en-US" smtClean="0"/>
-              <a:t>12/4/2019</a:t>
+              <a:t>12/6/2019</a:t>
             </a:fld>
             <a:endParaRPr lang="en-US"/>
           </a:p>
@@ -2806,7 +2808,7 @@
           <a:p>
             <a:fld id="{2A6D1854-81C2-4FDA-8865-EF069E4E10D9}" type="datetimeFigureOut">
               <a:rPr lang="en-US" smtClean="0"/>
-              <a:t>12/4/2019</a:t>
+              <a:t>12/6/2019</a:t>
             </a:fld>
             <a:endParaRPr lang="en-US"/>
           </a:p>
@@ -3856,6 +3858,297 @@
                 </a:solidFill>
                 <a:latin typeface="Acre Medium" panose="00000600000000000000" pitchFamily="50" charset="0"/>
               </a:rPr>
+              <a:t>SOURCES</a:t>
+            </a:r>
+            <a:endParaRPr lang="en-US" dirty="0">
+              <a:solidFill>
+                <a:schemeClr val="bg1"/>
+              </a:solidFill>
+            </a:endParaRPr>
+          </a:p>
+        </p:txBody>
+      </p:sp>
+      <p:sp>
+        <p:nvSpPr>
+          <p:cNvPr id="4" name="Content Placeholder 3"/>
+          <p:cNvSpPr>
+            <a:spLocks noGrp="1"/>
+          </p:cNvSpPr>
+          <p:nvPr>
+            <p:ph sz="half" idx="2"/>
+          </p:nvPr>
+        </p:nvSpPr>
+        <p:spPr>
+          <a:xfrm>
+            <a:off x="838201" y="1484768"/>
+            <a:ext cx="10515598" cy="4260939"/>
+          </a:xfrm>
+        </p:spPr>
+        <p:txBody>
+          <a:bodyPr>
+            <a:normAutofit fontScale="85000" lnSpcReduction="20000"/>
+          </a:bodyPr>
+          <a:lstStyle/>
+          <a:p>
+            <a:r>
+              <a:rPr lang="en-US" dirty="0" smtClean="0">
+                <a:solidFill>
+                  <a:schemeClr val="bg1"/>
+                </a:solidFill>
+                <a:hlinkClick r:id="rId2"/>
+              </a:rPr>
+              <a:t>https</a:t>
+            </a:r>
+            <a:r>
+              <a:rPr lang="en-US" dirty="0">
+                <a:solidFill>
+                  <a:schemeClr val="bg1"/>
+                </a:solidFill>
+                <a:hlinkClick r:id="rId2"/>
+              </a:rPr>
+              <a:t>://</a:t>
+            </a:r>
+            <a:r>
+              <a:rPr lang="en-US" dirty="0" smtClean="0">
+                <a:solidFill>
+                  <a:schemeClr val="bg1"/>
+                </a:solidFill>
+                <a:hlinkClick r:id="rId2"/>
+              </a:rPr>
+              <a:t>www.xilinx.com/support/documentation/sw_manuals/xilinx2019_2/ug1144-petalinux-tools-reference-guide.pdf</a:t>
+            </a:r>
+            <a:endParaRPr lang="en-US" dirty="0" smtClean="0">
+              <a:solidFill>
+                <a:schemeClr val="bg1"/>
+              </a:solidFill>
+            </a:endParaRPr>
+          </a:p>
+          <a:p>
+            <a:r>
+              <a:rPr lang="en-US" dirty="0">
+                <a:solidFill>
+                  <a:schemeClr val="bg1"/>
+                </a:solidFill>
+                <a:hlinkClick r:id="rId3"/>
+              </a:rPr>
+              <a:t>https://</a:t>
+            </a:r>
+            <a:r>
+              <a:rPr lang="en-US" dirty="0" smtClean="0">
+                <a:solidFill>
+                  <a:schemeClr val="bg1"/>
+                </a:solidFill>
+                <a:hlinkClick r:id="rId3"/>
+              </a:rPr>
+              <a:t>www.xilinx.com/support/documentation/sw_manuals/xilinx2019_2/ug1157-petalinux-tools-command-line-guide.pdf</a:t>
+            </a:r>
+            <a:endParaRPr lang="en-US" dirty="0" smtClean="0">
+              <a:solidFill>
+                <a:schemeClr val="bg1"/>
+              </a:solidFill>
+            </a:endParaRPr>
+          </a:p>
+          <a:p>
+            <a:r>
+              <a:rPr lang="en-US" dirty="0">
+                <a:solidFill>
+                  <a:schemeClr val="bg1"/>
+                </a:solidFill>
+                <a:hlinkClick r:id="rId4"/>
+              </a:rPr>
+              <a:t>https://www.yoctoproject.org</a:t>
+            </a:r>
+            <a:r>
+              <a:rPr lang="en-US" dirty="0" smtClean="0">
+                <a:solidFill>
+                  <a:schemeClr val="bg1"/>
+                </a:solidFill>
+                <a:hlinkClick r:id="rId4"/>
+              </a:rPr>
+              <a:t>/</a:t>
+            </a:r>
+            <a:endParaRPr lang="en-US" dirty="0" smtClean="0">
+              <a:solidFill>
+                <a:schemeClr val="bg1"/>
+              </a:solidFill>
+            </a:endParaRPr>
+          </a:p>
+          <a:p>
+            <a:r>
+              <a:rPr lang="en-US" dirty="0">
+                <a:solidFill>
+                  <a:schemeClr val="bg1"/>
+                </a:solidFill>
+                <a:hlinkClick r:id="rId5"/>
+              </a:rPr>
+              <a:t>https://reference.digilentinc.com/_</a:t>
+            </a:r>
+            <a:r>
+              <a:rPr lang="en-US" dirty="0" smtClean="0">
+                <a:solidFill>
+                  <a:schemeClr val="bg1"/>
+                </a:solidFill>
+                <a:hlinkClick r:id="rId5"/>
+              </a:rPr>
+              <a:t>media/reference/programmable-logic/arty/arty_rm.pdf</a:t>
+            </a:r>
+            <a:endParaRPr lang="en-US" dirty="0" smtClean="0">
+              <a:solidFill>
+                <a:schemeClr val="bg1"/>
+              </a:solidFill>
+            </a:endParaRPr>
+          </a:p>
+          <a:p>
+            <a:r>
+              <a:rPr lang="en-US" dirty="0">
+                <a:solidFill>
+                  <a:schemeClr val="bg1"/>
+                </a:solidFill>
+                <a:hlinkClick r:id="rId6"/>
+              </a:rPr>
+              <a:t>https://reference.digilentinc.com/_media/reference/programmable-logic/basys-3/basys3_rm.pdf?_ga=2.8933622.29982397.1565915174-26851832.1557255277&amp;_</a:t>
+            </a:r>
+            <a:r>
+              <a:rPr lang="en-US" dirty="0" smtClean="0">
+                <a:solidFill>
+                  <a:schemeClr val="bg1"/>
+                </a:solidFill>
+                <a:hlinkClick r:id="rId6"/>
+              </a:rPr>
+              <a:t>gac=1.211996064.1565915174.EAIaIQobChMIg4fPyJCG5AIVGh6tBh38AgkFEAAYASAAEgITxPD_BwE</a:t>
+            </a:r>
+            <a:endParaRPr lang="en-US" dirty="0" smtClean="0">
+              <a:solidFill>
+                <a:schemeClr val="bg1"/>
+              </a:solidFill>
+            </a:endParaRPr>
+          </a:p>
+          <a:p>
+            <a:r>
+              <a:rPr lang="en-US" dirty="0">
+                <a:solidFill>
+                  <a:schemeClr val="bg1"/>
+                </a:solidFill>
+                <a:hlinkClick r:id="rId7"/>
+              </a:rPr>
+              <a:t>https://</a:t>
+            </a:r>
+            <a:r>
+              <a:rPr lang="en-US" dirty="0" smtClean="0">
+                <a:solidFill>
+                  <a:schemeClr val="bg1"/>
+                </a:solidFill>
+                <a:hlinkClick r:id="rId7"/>
+              </a:rPr>
+              <a:t>www.youtube.com/watch?v=8oIZxv3fJxs</a:t>
+            </a:r>
+            <a:endParaRPr lang="en-US" dirty="0" smtClean="0">
+              <a:solidFill>
+                <a:schemeClr val="bg1"/>
+              </a:solidFill>
+            </a:endParaRPr>
+          </a:p>
+          <a:p>
+            <a:r>
+              <a:rPr lang="en-US" dirty="0">
+                <a:solidFill>
+                  <a:schemeClr val="bg1"/>
+                </a:solidFill>
+                <a:hlinkClick r:id="rId8"/>
+              </a:rPr>
+              <a:t>https://</a:t>
+            </a:r>
+            <a:r>
+              <a:rPr lang="en-US" dirty="0" smtClean="0">
+                <a:solidFill>
+                  <a:schemeClr val="bg1"/>
+                </a:solidFill>
+                <a:hlinkClick r:id="rId8"/>
+              </a:rPr>
+              <a:t>www.youtube.com/watch?v=TR2g6pAKRT0</a:t>
+            </a:r>
+            <a:endParaRPr lang="en-US" dirty="0" smtClean="0">
+              <a:solidFill>
+                <a:schemeClr val="bg1"/>
+              </a:solidFill>
+            </a:endParaRPr>
+          </a:p>
+          <a:p>
+            <a:endParaRPr lang="en-US" dirty="0">
+              <a:solidFill>
+                <a:schemeClr val="bg1"/>
+              </a:solidFill>
+            </a:endParaRPr>
+          </a:p>
+          <a:p>
+            <a:endParaRPr lang="en-US" dirty="0">
+              <a:solidFill>
+                <a:schemeClr val="bg1"/>
+              </a:solidFill>
+            </a:endParaRPr>
+          </a:p>
+          <a:p>
+            <a:endParaRPr lang="en-US" dirty="0"/>
+          </a:p>
+        </p:txBody>
+      </p:sp>
+    </p:spTree>
+    <p:extLst>
+      <p:ext uri="{BB962C8B-B14F-4D97-AF65-F5344CB8AC3E}">
+        <p14:creationId xmlns:p14="http://schemas.microsoft.com/office/powerpoint/2010/main" val="551708143"/>
+      </p:ext>
+    </p:extLst>
+  </p:cSld>
+  <p:clrMapOvr>
+    <a:masterClrMapping/>
+  </p:clrMapOvr>
+</p:sld>
+</file>
+
+<file path=ppt/slides/slide16.xml><?xml version="1.0" encoding="utf-8"?>
+<p:sld xmlns:a="http://schemas.openxmlformats.org/drawingml/2006/main" xmlns:r="http://schemas.openxmlformats.org/officeDocument/2006/relationships" xmlns:p="http://schemas.openxmlformats.org/presentationml/2006/main">
+  <p:cSld>
+    <p:spTree>
+      <p:nvGrpSpPr>
+        <p:cNvPr id="1" name=""/>
+        <p:cNvGrpSpPr/>
+        <p:nvPr/>
+      </p:nvGrpSpPr>
+      <p:grpSpPr>
+        <a:xfrm>
+          <a:off x="0" y="0"/>
+          <a:ext cx="0" cy="0"/>
+          <a:chOff x="0" y="0"/>
+          <a:chExt cx="0" cy="0"/>
+        </a:xfrm>
+      </p:grpSpPr>
+      <p:sp>
+        <p:nvSpPr>
+          <p:cNvPr id="2" name="Title 1"/>
+          <p:cNvSpPr>
+            <a:spLocks noGrp="1"/>
+          </p:cNvSpPr>
+          <p:nvPr>
+            <p:ph type="title"/>
+          </p:nvPr>
+        </p:nvSpPr>
+        <p:spPr>
+          <a:xfrm>
+            <a:off x="838199" y="352978"/>
+            <a:ext cx="10515600" cy="1325563"/>
+          </a:xfrm>
+        </p:spPr>
+        <p:txBody>
+          <a:bodyPr/>
+          <a:lstStyle/>
+          <a:p>
+            <a:r>
+              <a:rPr lang="en-US" dirty="0" smtClean="0">
+                <a:solidFill>
+                  <a:schemeClr val="bg1"/>
+                </a:solidFill>
+                <a:latin typeface="Acre Medium" panose="00000600000000000000" pitchFamily="50" charset="0"/>
+              </a:rPr>
               <a:t>GIT REPO</a:t>
             </a:r>
             <a:endParaRPr lang="en-US" dirty="0">
@@ -4066,11 +4359,6 @@
               </a:rPr>
               <a:t>https://github.com/chrismajor2124/CSCI460_Final_Project_Yocto_on_Microblaze</a:t>
             </a:r>
-            <a:endParaRPr lang="en-US" sz="1200" i="1" dirty="0">
-              <a:solidFill>
-                <a:schemeClr val="bg1"/>
-              </a:solidFill>
-            </a:endParaRPr>
           </a:p>
         </p:txBody>
       </p:sp>

</xml_diff>